<commit_message>
update week 2 slides
</commit_message>
<xml_diff>
--- a/materials/Week 2.pptx
+++ b/materials/Week 2.pptx
@@ -7,19 +7,13 @@
   <p:sldIdLst>
     <p:sldId id="256" r:id="rId2"/>
     <p:sldId id="262" r:id="rId3"/>
-    <p:sldId id="263" r:id="rId4"/>
-    <p:sldId id="257" r:id="rId5"/>
-    <p:sldId id="258" r:id="rId6"/>
-    <p:sldId id="259" r:id="rId7"/>
-    <p:sldId id="260" r:id="rId8"/>
-    <p:sldId id="261" r:id="rId9"/>
-    <p:sldId id="264" r:id="rId10"/>
-    <p:sldId id="265" r:id="rId11"/>
-    <p:sldId id="266" r:id="rId12"/>
-    <p:sldId id="267" r:id="rId13"/>
-    <p:sldId id="268" r:id="rId14"/>
-    <p:sldId id="269" r:id="rId15"/>
-    <p:sldId id="270" r:id="rId16"/>
+    <p:sldId id="271" r:id="rId4"/>
+    <p:sldId id="272" r:id="rId5"/>
+    <p:sldId id="273" r:id="rId6"/>
+    <p:sldId id="274" r:id="rId7"/>
+    <p:sldId id="267" r:id="rId8"/>
+    <p:sldId id="269" r:id="rId9"/>
+    <p:sldId id="275" r:id="rId10"/>
   </p:sldIdLst>
   <p:sldSz cx="12192000" cy="6858000"/>
   <p:notesSz cx="6858000" cy="9144000"/>
@@ -118,6 +112,11 @@
       </a:defRPr>
     </a:lvl9pPr>
   </p:defaultTextStyle>
+  <p:extLst>
+    <p:ext uri="{EFAFB233-063F-42B5-8137-9DF3F51BA10A}">
+      <p15:sldGuideLst xmlns:p15="http://schemas.microsoft.com/office/powerpoint/2012/main"/>
+    </p:ext>
+  </p:extLst>
 </p:presentation>
 </file>
 
@@ -268,7 +267,7 @@
           <a:p>
             <a:fld id="{FD78CC58-CA34-4354-816E-34371E496FF3}" type="datetimeFigureOut">
               <a:rPr lang="en-US" smtClean="0"/>
-              <a:t>4/10/2019</a:t>
+              <a:t>9/24/2019</a:t>
             </a:fld>
             <a:endParaRPr lang="en-US"/>
           </a:p>
@@ -466,7 +465,7 @@
           <a:p>
             <a:fld id="{FD78CC58-CA34-4354-816E-34371E496FF3}" type="datetimeFigureOut">
               <a:rPr lang="en-US" smtClean="0"/>
-              <a:t>4/10/2019</a:t>
+              <a:t>9/24/2019</a:t>
             </a:fld>
             <a:endParaRPr lang="en-US"/>
           </a:p>
@@ -674,7 +673,7 @@
           <a:p>
             <a:fld id="{FD78CC58-CA34-4354-816E-34371E496FF3}" type="datetimeFigureOut">
               <a:rPr lang="en-US" smtClean="0"/>
-              <a:t>4/10/2019</a:t>
+              <a:t>9/24/2019</a:t>
             </a:fld>
             <a:endParaRPr lang="en-US"/>
           </a:p>
@@ -872,7 +871,7 @@
           <a:p>
             <a:fld id="{FD78CC58-CA34-4354-816E-34371E496FF3}" type="datetimeFigureOut">
               <a:rPr lang="en-US" smtClean="0"/>
-              <a:t>4/10/2019</a:t>
+              <a:t>9/24/2019</a:t>
             </a:fld>
             <a:endParaRPr lang="en-US"/>
           </a:p>
@@ -1147,7 +1146,7 @@
           <a:p>
             <a:fld id="{FD78CC58-CA34-4354-816E-34371E496FF3}" type="datetimeFigureOut">
               <a:rPr lang="en-US" smtClean="0"/>
-              <a:t>4/10/2019</a:t>
+              <a:t>9/24/2019</a:t>
             </a:fld>
             <a:endParaRPr lang="en-US"/>
           </a:p>
@@ -1412,7 +1411,7 @@
           <a:p>
             <a:fld id="{FD78CC58-CA34-4354-816E-34371E496FF3}" type="datetimeFigureOut">
               <a:rPr lang="en-US" smtClean="0"/>
-              <a:t>4/10/2019</a:t>
+              <a:t>9/24/2019</a:t>
             </a:fld>
             <a:endParaRPr lang="en-US"/>
           </a:p>
@@ -1824,7 +1823,7 @@
           <a:p>
             <a:fld id="{FD78CC58-CA34-4354-816E-34371E496FF3}" type="datetimeFigureOut">
               <a:rPr lang="en-US" smtClean="0"/>
-              <a:t>4/10/2019</a:t>
+              <a:t>9/24/2019</a:t>
             </a:fld>
             <a:endParaRPr lang="en-US"/>
           </a:p>
@@ -1965,7 +1964,7 @@
           <a:p>
             <a:fld id="{FD78CC58-CA34-4354-816E-34371E496FF3}" type="datetimeFigureOut">
               <a:rPr lang="en-US" smtClean="0"/>
-              <a:t>4/10/2019</a:t>
+              <a:t>9/24/2019</a:t>
             </a:fld>
             <a:endParaRPr lang="en-US"/>
           </a:p>
@@ -2078,7 +2077,7 @@
           <a:p>
             <a:fld id="{FD78CC58-CA34-4354-816E-34371E496FF3}" type="datetimeFigureOut">
               <a:rPr lang="en-US" smtClean="0"/>
-              <a:t>4/10/2019</a:t>
+              <a:t>9/24/2019</a:t>
             </a:fld>
             <a:endParaRPr lang="en-US"/>
           </a:p>
@@ -2389,7 +2388,7 @@
           <a:p>
             <a:fld id="{FD78CC58-CA34-4354-816E-34371E496FF3}" type="datetimeFigureOut">
               <a:rPr lang="en-US" smtClean="0"/>
-              <a:t>4/10/2019</a:t>
+              <a:t>9/24/2019</a:t>
             </a:fld>
             <a:endParaRPr lang="en-US"/>
           </a:p>
@@ -2677,7 +2676,7 @@
           <a:p>
             <a:fld id="{FD78CC58-CA34-4354-816E-34371E496FF3}" type="datetimeFigureOut">
               <a:rPr lang="en-US" smtClean="0"/>
-              <a:t>4/10/2019</a:t>
+              <a:t>9/24/2019</a:t>
             </a:fld>
             <a:endParaRPr lang="en-US"/>
           </a:p>
@@ -2918,7 +2917,7 @@
           <a:p>
             <a:fld id="{FD78CC58-CA34-4354-816E-34371E496FF3}" type="datetimeFigureOut">
               <a:rPr lang="en-US" smtClean="0"/>
-              <a:t>4/10/2019</a:t>
+              <a:t>9/24/2019</a:t>
             </a:fld>
             <a:endParaRPr lang="en-US"/>
           </a:p>
@@ -3321,6 +3320,14 @@
 <file path=ppt/slides/slide1.xml><?xml version="1.0" encoding="utf-8"?>
 <p:sld xmlns:a="http://schemas.openxmlformats.org/drawingml/2006/main" xmlns:r="http://schemas.openxmlformats.org/officeDocument/2006/relationships" xmlns:p="http://schemas.openxmlformats.org/presentationml/2006/main">
   <p:cSld>
+    <p:bg>
+      <p:bgPr>
+        <a:solidFill>
+          <a:srgbClr val="000000"/>
+        </a:solidFill>
+        <a:effectLst/>
+      </p:bgPr>
+    </p:bg>
     <p:spTree>
       <p:nvGrpSpPr>
         <p:cNvPr id="1" name=""/>
@@ -3337,6 +3344,105 @@
       </p:grpSpPr>
       <p:sp>
         <p:nvSpPr>
+          <p:cNvPr id="25" name="Rectangle 20">
+            <a:extLst>
+              <a:ext uri="{FF2B5EF4-FFF2-40B4-BE49-F238E27FC236}">
+                <a16:creationId xmlns:a16="http://schemas.microsoft.com/office/drawing/2014/main" id="{71B2258F-86CA-4D4D-8270-BC05FCDEBFB3}"/>
+              </a:ext>
+              <a:ext uri="{C183D7F6-B498-43B3-948B-1728B52AA6E4}">
+                <adec:decorative xmlns:adec="http://schemas.microsoft.com/office/drawing/2017/decorative" val="1"/>
+              </a:ext>
+            </a:extLst>
+          </p:cNvPr>
+          <p:cNvSpPr>
+            <a:spLocks noGrp="1" noRot="1" noChangeAspect="1" noMove="1" noResize="1" noEditPoints="1" noAdjustHandles="1" noChangeArrowheads="1" noChangeShapeType="1" noTextEdit="1"/>
+          </p:cNvSpPr>
+          <p:nvPr>
+            <p:extLst>
+              <p:ext uri="{386F3935-93C4-4BCD-93E2-E3B085C9AB24}">
+                <p16:designElem xmlns:p16="http://schemas.microsoft.com/office/powerpoint/2015/main" val="1"/>
+              </p:ext>
+            </p:extLst>
+          </p:nvPr>
+        </p:nvSpPr>
+        <p:spPr>
+          <a:xfrm>
+            <a:off x="0" y="0"/>
+            <a:ext cx="12192000" cy="6857999"/>
+          </a:xfrm>
+          <a:prstGeom prst="rect">
+            <a:avLst/>
+          </a:prstGeom>
+          <a:solidFill>
+            <a:srgbClr val="000000"/>
+          </a:solidFill>
+          <a:ln>
+            <a:noFill/>
+          </a:ln>
+        </p:spPr>
+        <p:style>
+          <a:lnRef idx="2">
+            <a:schemeClr val="accent1">
+              <a:shade val="50000"/>
+            </a:schemeClr>
+          </a:lnRef>
+          <a:fillRef idx="1">
+            <a:schemeClr val="accent1"/>
+          </a:fillRef>
+          <a:effectRef idx="0">
+            <a:schemeClr val="accent1"/>
+          </a:effectRef>
+          <a:fontRef idx="minor">
+            <a:schemeClr val="lt1"/>
+          </a:fontRef>
+        </p:style>
+        <p:txBody>
+          <a:bodyPr rtlCol="0" anchor="ctr"/>
+          <a:lstStyle/>
+          <a:p>
+            <a:pPr algn="ctr"/>
+            <a:endParaRPr lang="en-US"/>
+          </a:p>
+        </p:txBody>
+      </p:sp>
+      <p:pic>
+        <p:nvPicPr>
+          <p:cNvPr id="5" name="Picture 4">
+            <a:extLst>
+              <a:ext uri="{FF2B5EF4-FFF2-40B4-BE49-F238E27FC236}">
+                <a16:creationId xmlns:a16="http://schemas.microsoft.com/office/drawing/2014/main" id="{92822F37-4A30-486A-BA04-F86A66FB015E}"/>
+              </a:ext>
+            </a:extLst>
+          </p:cNvPr>
+          <p:cNvPicPr>
+            <a:picLocks noChangeAspect="1"/>
+          </p:cNvPicPr>
+          <p:nvPr/>
+        </p:nvPicPr>
+        <p:blipFill rotWithShape="1">
+          <a:blip r:embed="rId2">
+            <a:alphaModFix amt="50000"/>
+            <a:extLst>
+              <a:ext uri="{28A0092B-C50C-407E-A947-70E740481C1C}">
+                <a14:useLocalDpi xmlns:a14="http://schemas.microsoft.com/office/drawing/2010/main" val="0"/>
+              </a:ext>
+            </a:extLst>
+          </a:blip>
+          <a:srcRect t="22424" b="21326"/>
+          <a:stretch/>
+        </p:blipFill>
+        <p:spPr>
+          <a:xfrm>
+            <a:off x="20" y="1"/>
+            <a:ext cx="12191980" cy="6857999"/>
+          </a:xfrm>
+          <a:prstGeom prst="rect">
+            <a:avLst/>
+          </a:prstGeom>
+        </p:spPr>
+      </p:pic>
+      <p:sp>
+        <p:nvSpPr>
           <p:cNvPr id="2" name="Title 1">
             <a:extLst>
               <a:ext uri="{FF2B5EF4-FFF2-40B4-BE49-F238E27FC236}">
@@ -3351,14 +3457,31 @@
             <p:ph type="ctrTitle"/>
           </p:nvPr>
         </p:nvSpPr>
-        <p:spPr/>
-        <p:txBody>
-          <a:bodyPr/>
-          <a:lstStyle/>
-          <a:p>
-            <a:r>
-              <a:rPr lang="en-US" dirty="0"/>
-              <a:t>Week 2</a:t>
+        <p:spPr>
+          <a:xfrm>
+            <a:off x="1524000" y="1122362"/>
+            <a:ext cx="9144000" cy="2900518"/>
+          </a:xfrm>
+        </p:spPr>
+        <p:txBody>
+          <a:bodyPr>
+            <a:normAutofit/>
+          </a:bodyPr>
+          <a:lstStyle/>
+          <a:p>
+            <a:r>
+              <a:rPr lang="en-US">
+                <a:ln w="22225">
+                  <a:solidFill>
+                    <a:schemeClr val="tx1"/>
+                  </a:solidFill>
+                  <a:miter lim="800000"/>
+                </a:ln>
+                <a:solidFill>
+                  <a:srgbClr val="FFFFFF"/>
+                </a:solidFill>
+              </a:rPr>
+              <a:t>Week 2 Key Concepts</a:t>
             </a:r>
           </a:p>
         </p:txBody>
@@ -3379,12 +3502,36 @@
             <p:ph type="subTitle" idx="1"/>
           </p:nvPr>
         </p:nvSpPr>
-        <p:spPr/>
-        <p:txBody>
-          <a:bodyPr/>
-          <a:lstStyle/>
-          <a:p>
-            <a:endParaRPr lang="en-US"/>
+        <p:spPr>
+          <a:xfrm>
+            <a:off x="1524000" y="4159404"/>
+            <a:ext cx="9144000" cy="1098395"/>
+          </a:xfrm>
+        </p:spPr>
+        <p:txBody>
+          <a:bodyPr>
+            <a:normAutofit/>
+          </a:bodyPr>
+          <a:lstStyle/>
+          <a:p>
+            <a:r>
+              <a:rPr lang="en-US">
+                <a:solidFill>
+                  <a:srgbClr val="FFFFFF"/>
+                </a:solidFill>
+              </a:rPr>
+              <a:t>NURS 6075</a:t>
+            </a:r>
+          </a:p>
+          <a:p>
+            <a:r>
+              <a:rPr lang="en-US">
+                <a:solidFill>
+                  <a:srgbClr val="FFFFFF"/>
+                </a:solidFill>
+              </a:rPr>
+              <a:t>Chris Macintosh, PhD, RN</a:t>
+            </a:r>
           </a:p>
         </p:txBody>
       </p:sp>
@@ -3396,14 +3543,22 @@
     </p:extLst>
   </p:cSld>
   <p:clrMapOvr>
-    <a:masterClrMapping/>
+    <a:overrideClrMapping bg1="dk1" tx1="lt1" bg2="dk2" tx2="lt2" accent1="accent1" accent2="accent2" accent3="accent3" accent4="accent4" accent5="accent5" accent6="accent6" hlink="hlink" folHlink="folHlink"/>
   </p:clrMapOvr>
 </p:sld>
 </file>
 
-<file path=ppt/slides/slide10.xml><?xml version="1.0" encoding="utf-8"?>
+<file path=ppt/slides/slide2.xml><?xml version="1.0" encoding="utf-8"?>
 <p:sld xmlns:a="http://schemas.openxmlformats.org/drawingml/2006/main" xmlns:r="http://schemas.openxmlformats.org/officeDocument/2006/relationships" xmlns:p="http://schemas.openxmlformats.org/presentationml/2006/main">
   <p:cSld>
+    <p:bg>
+      <p:bgPr>
+        <a:solidFill>
+          <a:schemeClr val="bg1"/>
+        </a:solidFill>
+        <a:effectLst/>
+      </p:bgPr>
+    </p:bg>
     <p:spTree>
       <p:nvGrpSpPr>
         <p:cNvPr id="1" name=""/>
@@ -3420,10 +3575,102 @@
       </p:grpSpPr>
       <p:sp>
         <p:nvSpPr>
+          <p:cNvPr id="12" name="Rectangle 11">
+            <a:extLst>
+              <a:ext uri="{FF2B5EF4-FFF2-40B4-BE49-F238E27FC236}">
+                <a16:creationId xmlns:a16="http://schemas.microsoft.com/office/drawing/2014/main" id="{42A5316D-ED2F-4F89-B4B4-8D9240B1A348}"/>
+              </a:ext>
+              <a:ext uri="{C183D7F6-B498-43B3-948B-1728B52AA6E4}">
+                <adec:decorative xmlns:adec="http://schemas.microsoft.com/office/drawing/2017/decorative" val="1"/>
+              </a:ext>
+            </a:extLst>
+          </p:cNvPr>
+          <p:cNvSpPr>
+            <a:spLocks noGrp="1" noRot="1" noChangeAspect="1" noMove="1" noResize="1" noEditPoints="1" noAdjustHandles="1" noChangeArrowheads="1" noChangeShapeType="1" noTextEdit="1"/>
+          </p:cNvSpPr>
+          <p:nvPr>
+            <p:extLst>
+              <p:ext uri="{386F3935-93C4-4BCD-93E2-E3B085C9AB24}">
+                <p16:designElem xmlns:p16="http://schemas.microsoft.com/office/powerpoint/2015/main" val="1"/>
+              </p:ext>
+            </p:extLst>
+          </p:nvPr>
+        </p:nvSpPr>
+        <p:spPr>
+          <a:xfrm>
+            <a:off x="0" y="0"/>
+            <a:ext cx="2013557" cy="6858000"/>
+          </a:xfrm>
+          <a:prstGeom prst="rect">
+            <a:avLst/>
+          </a:prstGeom>
+          <a:solidFill>
+            <a:srgbClr val="7F7F7F"/>
+          </a:solidFill>
+          <a:ln>
+            <a:noFill/>
+          </a:ln>
+        </p:spPr>
+        <p:style>
+          <a:lnRef idx="2">
+            <a:schemeClr val="accent1">
+              <a:shade val="50000"/>
+            </a:schemeClr>
+          </a:lnRef>
+          <a:fillRef idx="1">
+            <a:schemeClr val="accent1"/>
+          </a:fillRef>
+          <a:effectRef idx="0">
+            <a:schemeClr val="accent1"/>
+          </a:effectRef>
+          <a:fontRef idx="minor">
+            <a:schemeClr val="lt1"/>
+          </a:fontRef>
+        </p:style>
+        <p:txBody>
+          <a:bodyPr rtlCol="0" anchor="ctr"/>
+          <a:lstStyle/>
+          <a:p>
+            <a:pPr marL="0" marR="0" lvl="0" indent="0" algn="ctr" defTabSz="914400" rtl="0" eaLnBrk="1" fontAlgn="auto" latinLnBrk="0" hangingPunct="1">
+              <a:lnSpc>
+                <a:spcPct val="100000"/>
+              </a:lnSpc>
+              <a:spcBef>
+                <a:spcPts val="0"/>
+              </a:spcBef>
+              <a:spcAft>
+                <a:spcPts val="0"/>
+              </a:spcAft>
+              <a:buClrTx/>
+              <a:buSzTx/>
+              <a:buFontTx/>
+              <a:buNone/>
+              <a:tabLst/>
+              <a:defRPr/>
+            </a:pPr>
+            <a:endParaRPr kumimoji="0" lang="en-US" sz="1800" b="0" i="0" u="none" strike="noStrike" kern="1200" cap="none" spc="0" normalizeH="0" baseline="0" noProof="0">
+              <a:ln>
+                <a:noFill/>
+              </a:ln>
+              <a:solidFill>
+                <a:prstClr val="white"/>
+              </a:solidFill>
+              <a:effectLst/>
+              <a:uLnTx/>
+              <a:uFillTx/>
+              <a:latin typeface="Calibri" panose="020F0502020204030204"/>
+              <a:ea typeface="+mn-ea"/>
+              <a:cs typeface="+mn-cs"/>
+            </a:endParaRPr>
+          </a:p>
+        </p:txBody>
+      </p:sp>
+      <p:sp>
+        <p:nvSpPr>
           <p:cNvPr id="2" name="Title 1">
             <a:extLst>
               <a:ext uri="{FF2B5EF4-FFF2-40B4-BE49-F238E27FC236}">
-                <a16:creationId xmlns:a16="http://schemas.microsoft.com/office/drawing/2014/main" id="{93391F9A-B3A7-45E4-AF2D-E0BD600EE257}"/>
+                <a16:creationId xmlns:a16="http://schemas.microsoft.com/office/drawing/2014/main" id="{EDFF7803-E8FA-478B-B1B4-4DD580E2DD72}"/>
               </a:ext>
             </a:extLst>
           </p:cNvPr>
@@ -3434,24 +3681,83 @@
             <p:ph type="title"/>
           </p:nvPr>
         </p:nvSpPr>
-        <p:spPr/>
-        <p:txBody>
-          <a:bodyPr/>
-          <a:lstStyle/>
-          <a:p>
-            <a:r>
-              <a:rPr lang="en-US" dirty="0"/>
-              <a:t>Bar Chart</a:t>
-            </a:r>
-          </a:p>
-        </p:txBody>
-      </p:sp>
-      <p:sp>
-        <p:nvSpPr>
-          <p:cNvPr id="3" name="Content Placeholder 2">
-            <a:extLst>
-              <a:ext uri="{FF2B5EF4-FFF2-40B4-BE49-F238E27FC236}">
-                <a16:creationId xmlns:a16="http://schemas.microsoft.com/office/drawing/2014/main" id="{A8F02B01-BB9D-45B3-B6AA-C6F5D7034B79}"/>
+        <p:spPr>
+          <a:xfrm>
+            <a:off x="694510" y="1487272"/>
+            <a:ext cx="2743200" cy="2743200"/>
+          </a:xfrm>
+          <a:prstGeom prst="ellipse">
+            <a:avLst/>
+          </a:prstGeom>
+          <a:solidFill>
+            <a:srgbClr val="262626"/>
+          </a:solidFill>
+          <a:ln w="174625" cmpd="thinThick">
+            <a:solidFill>
+              <a:srgbClr val="262626"/>
+            </a:solidFill>
+          </a:ln>
+        </p:spPr>
+        <p:txBody>
+          <a:bodyPr>
+            <a:normAutofit/>
+          </a:bodyPr>
+          <a:lstStyle/>
+          <a:p>
+            <a:pPr algn="ctr"/>
+            <a:r>
+              <a:rPr lang="en-US" sz="2600" dirty="0">
+                <a:solidFill>
+                  <a:srgbClr val="FFFFFF"/>
+                </a:solidFill>
+              </a:rPr>
+              <a:t>Data Analysis Process – Data Cleaning (Tidy)</a:t>
+            </a:r>
+          </a:p>
+        </p:txBody>
+      </p:sp>
+      <p:pic>
+        <p:nvPicPr>
+          <p:cNvPr id="5" name="Content Placeholder 4">
+            <a:extLst>
+              <a:ext uri="{FF2B5EF4-FFF2-40B4-BE49-F238E27FC236}">
+                <a16:creationId xmlns:a16="http://schemas.microsoft.com/office/drawing/2014/main" id="{1366BAC5-0F04-49C1-B298-4A2EA009617D}"/>
+              </a:ext>
+            </a:extLst>
+          </p:cNvPr>
+          <p:cNvPicPr>
+            <a:picLocks noChangeAspect="1"/>
+          </p:cNvPicPr>
+          <p:nvPr/>
+        </p:nvPicPr>
+        <p:blipFill>
+          <a:blip r:embed="rId2">
+            <a:extLst>
+              <a:ext uri="{28A0092B-C50C-407E-A947-70E740481C1C}">
+                <a14:useLocalDpi xmlns:a14="http://schemas.microsoft.com/office/drawing/2010/main" val="0"/>
+              </a:ext>
+            </a:extLst>
+          </a:blip>
+          <a:stretch>
+            <a:fillRect/>
+          </a:stretch>
+        </p:blipFill>
+        <p:spPr>
+          <a:xfrm>
+            <a:off x="4038600" y="1538041"/>
+            <a:ext cx="7188199" cy="2641662"/>
+          </a:xfrm>
+          <a:prstGeom prst="rect">
+            <a:avLst/>
+          </a:prstGeom>
+        </p:spPr>
+      </p:pic>
+      <p:sp>
+        <p:nvSpPr>
+          <p:cNvPr id="9" name="Content Placeholder 8">
+            <a:extLst>
+              <a:ext uri="{FF2B5EF4-FFF2-40B4-BE49-F238E27FC236}">
+                <a16:creationId xmlns:a16="http://schemas.microsoft.com/office/drawing/2014/main" id="{CB7E60FF-1F41-410D-AA1A-3D25688B835E}"/>
               </a:ext>
             </a:extLst>
           </p:cNvPr>
@@ -3462,567 +3768,42 @@
             <p:ph idx="1"/>
           </p:nvPr>
         </p:nvSpPr>
-        <p:spPr/>
-        <p:txBody>
-          <a:bodyPr/>
-          <a:lstStyle/>
-          <a:p>
-            <a:endParaRPr lang="en-US"/>
-          </a:p>
-        </p:txBody>
-      </p:sp>
-    </p:spTree>
-    <p:extLst>
-      <p:ext uri="{BB962C8B-B14F-4D97-AF65-F5344CB8AC3E}">
-        <p14:creationId xmlns:p14="http://schemas.microsoft.com/office/powerpoint/2010/main" val="3973900483"/>
-      </p:ext>
-    </p:extLst>
-  </p:cSld>
-  <p:clrMapOvr>
-    <a:masterClrMapping/>
-  </p:clrMapOvr>
-</p:sld>
-</file>
-
-<file path=ppt/slides/slide11.xml><?xml version="1.0" encoding="utf-8"?>
-<p:sld xmlns:a="http://schemas.openxmlformats.org/drawingml/2006/main" xmlns:r="http://schemas.openxmlformats.org/officeDocument/2006/relationships" xmlns:p="http://schemas.openxmlformats.org/presentationml/2006/main">
-  <p:cSld>
-    <p:spTree>
-      <p:nvGrpSpPr>
-        <p:cNvPr id="1" name=""/>
-        <p:cNvGrpSpPr/>
-        <p:nvPr/>
-      </p:nvGrpSpPr>
-      <p:grpSpPr>
-        <a:xfrm>
-          <a:off x="0" y="0"/>
-          <a:ext cx="0" cy="0"/>
-          <a:chOff x="0" y="0"/>
-          <a:chExt cx="0" cy="0"/>
-        </a:xfrm>
-      </p:grpSpPr>
-      <p:sp>
-        <p:nvSpPr>
-          <p:cNvPr id="2" name="Title 1">
-            <a:extLst>
-              <a:ext uri="{FF2B5EF4-FFF2-40B4-BE49-F238E27FC236}">
-                <a16:creationId xmlns:a16="http://schemas.microsoft.com/office/drawing/2014/main" id="{AD1270D2-756A-4E5B-B923-78277643D0CC}"/>
-              </a:ext>
-            </a:extLst>
-          </p:cNvPr>
-          <p:cNvSpPr>
-            <a:spLocks noGrp="1"/>
-          </p:cNvSpPr>
-          <p:nvPr>
-            <p:ph type="title"/>
-          </p:nvPr>
-        </p:nvSpPr>
-        <p:spPr/>
-        <p:txBody>
-          <a:bodyPr/>
-          <a:lstStyle/>
-          <a:p>
-            <a:r>
-              <a:rPr lang="en-US" dirty="0"/>
-              <a:t>Scatterplot</a:t>
-            </a:r>
-          </a:p>
-        </p:txBody>
-      </p:sp>
-      <p:sp>
-        <p:nvSpPr>
-          <p:cNvPr id="3" name="Content Placeholder 2">
-            <a:extLst>
-              <a:ext uri="{FF2B5EF4-FFF2-40B4-BE49-F238E27FC236}">
-                <a16:creationId xmlns:a16="http://schemas.microsoft.com/office/drawing/2014/main" id="{A96DFE2B-A795-4C41-A2F9-C41E75064D67}"/>
-              </a:ext>
-            </a:extLst>
-          </p:cNvPr>
-          <p:cNvSpPr>
-            <a:spLocks noGrp="1"/>
-          </p:cNvSpPr>
-          <p:nvPr>
-            <p:ph idx="1"/>
-          </p:nvPr>
-        </p:nvSpPr>
-        <p:spPr/>
-        <p:txBody>
-          <a:bodyPr/>
-          <a:lstStyle/>
-          <a:p>
-            <a:endParaRPr lang="en-US"/>
-          </a:p>
-        </p:txBody>
-      </p:sp>
-    </p:spTree>
-    <p:extLst>
-      <p:ext uri="{BB962C8B-B14F-4D97-AF65-F5344CB8AC3E}">
-        <p14:creationId xmlns:p14="http://schemas.microsoft.com/office/powerpoint/2010/main" val="3710533847"/>
-      </p:ext>
-    </p:extLst>
-  </p:cSld>
-  <p:clrMapOvr>
-    <a:masterClrMapping/>
-  </p:clrMapOvr>
-</p:sld>
-</file>
-
-<file path=ppt/slides/slide12.xml><?xml version="1.0" encoding="utf-8"?>
-<p:sld xmlns:a="http://schemas.openxmlformats.org/drawingml/2006/main" xmlns:r="http://schemas.openxmlformats.org/officeDocument/2006/relationships" xmlns:p="http://schemas.openxmlformats.org/presentationml/2006/main">
-  <p:cSld>
-    <p:spTree>
-      <p:nvGrpSpPr>
-        <p:cNvPr id="1" name=""/>
-        <p:cNvGrpSpPr/>
-        <p:nvPr/>
-      </p:nvGrpSpPr>
-      <p:grpSpPr>
-        <a:xfrm>
-          <a:off x="0" y="0"/>
-          <a:ext cx="0" cy="0"/>
-          <a:chOff x="0" y="0"/>
-          <a:chExt cx="0" cy="0"/>
-        </a:xfrm>
-      </p:grpSpPr>
-      <p:sp>
-        <p:nvSpPr>
-          <p:cNvPr id="2" name="Title 1">
-            <a:extLst>
-              <a:ext uri="{FF2B5EF4-FFF2-40B4-BE49-F238E27FC236}">
-                <a16:creationId xmlns:a16="http://schemas.microsoft.com/office/drawing/2014/main" id="{75F1CD42-C951-4EEC-98F7-EFF604C1790D}"/>
-              </a:ext>
-            </a:extLst>
-          </p:cNvPr>
-          <p:cNvSpPr>
-            <a:spLocks noGrp="1"/>
-          </p:cNvSpPr>
-          <p:nvPr>
-            <p:ph type="title"/>
-          </p:nvPr>
-        </p:nvSpPr>
-        <p:spPr/>
-        <p:txBody>
-          <a:bodyPr/>
-          <a:lstStyle/>
-          <a:p>
-            <a:r>
-              <a:rPr lang="en-US" dirty="0"/>
-              <a:t>Outliers</a:t>
-            </a:r>
-          </a:p>
-        </p:txBody>
-      </p:sp>
-      <p:sp>
-        <p:nvSpPr>
-          <p:cNvPr id="3" name="Content Placeholder 2">
-            <a:extLst>
-              <a:ext uri="{FF2B5EF4-FFF2-40B4-BE49-F238E27FC236}">
-                <a16:creationId xmlns:a16="http://schemas.microsoft.com/office/drawing/2014/main" id="{E268BF80-D309-40A8-A38D-415D1FEFCE66}"/>
-              </a:ext>
-            </a:extLst>
-          </p:cNvPr>
-          <p:cNvSpPr>
-            <a:spLocks noGrp="1"/>
-          </p:cNvSpPr>
-          <p:nvPr>
-            <p:ph idx="1"/>
-          </p:nvPr>
-        </p:nvSpPr>
-        <p:spPr/>
-        <p:txBody>
-          <a:bodyPr/>
-          <a:lstStyle/>
-          <a:p>
-            <a:r>
-              <a:rPr lang="en-US" dirty="0"/>
-              <a:t>Univariate</a:t>
-            </a:r>
-          </a:p>
-          <a:p>
-            <a:r>
-              <a:rPr lang="en-US" dirty="0"/>
-              <a:t>Mixed normal distributions</a:t>
-            </a:r>
-          </a:p>
-          <a:p>
-            <a:r>
-              <a:rPr lang="en-US" dirty="0"/>
-              <a:t>Plots</a:t>
-            </a:r>
-          </a:p>
-        </p:txBody>
-      </p:sp>
-    </p:spTree>
-    <p:extLst>
-      <p:ext uri="{BB962C8B-B14F-4D97-AF65-F5344CB8AC3E}">
-        <p14:creationId xmlns:p14="http://schemas.microsoft.com/office/powerpoint/2010/main" val="3769890924"/>
-      </p:ext>
-    </p:extLst>
-  </p:cSld>
-  <p:clrMapOvr>
-    <a:masterClrMapping/>
-  </p:clrMapOvr>
-</p:sld>
-</file>
-
-<file path=ppt/slides/slide13.xml><?xml version="1.0" encoding="utf-8"?>
-<p:sld xmlns:a="http://schemas.openxmlformats.org/drawingml/2006/main" xmlns:r="http://schemas.openxmlformats.org/officeDocument/2006/relationships" xmlns:p="http://schemas.openxmlformats.org/presentationml/2006/main">
-  <p:cSld>
-    <p:spTree>
-      <p:nvGrpSpPr>
-        <p:cNvPr id="1" name=""/>
-        <p:cNvGrpSpPr/>
-        <p:nvPr/>
-      </p:nvGrpSpPr>
-      <p:grpSpPr>
-        <a:xfrm>
-          <a:off x="0" y="0"/>
-          <a:ext cx="0" cy="0"/>
-          <a:chOff x="0" y="0"/>
-          <a:chExt cx="0" cy="0"/>
-        </a:xfrm>
-      </p:grpSpPr>
-      <p:sp>
-        <p:nvSpPr>
-          <p:cNvPr id="2" name="Title 1">
-            <a:extLst>
-              <a:ext uri="{FF2B5EF4-FFF2-40B4-BE49-F238E27FC236}">
-                <a16:creationId xmlns:a16="http://schemas.microsoft.com/office/drawing/2014/main" id="{A2147331-6FE2-49F0-8601-FD026A06638C}"/>
-              </a:ext>
-            </a:extLst>
-          </p:cNvPr>
-          <p:cNvSpPr>
-            <a:spLocks noGrp="1"/>
-          </p:cNvSpPr>
-          <p:nvPr>
-            <p:ph type="title"/>
-          </p:nvPr>
-        </p:nvSpPr>
-        <p:spPr/>
-        <p:txBody>
-          <a:bodyPr/>
-          <a:lstStyle/>
-          <a:p>
-            <a:r>
-              <a:rPr lang="en-US" dirty="0"/>
-              <a:t>Normal Distribution</a:t>
-            </a:r>
-          </a:p>
-        </p:txBody>
-      </p:sp>
-      <p:sp>
-        <p:nvSpPr>
-          <p:cNvPr id="3" name="Content Placeholder 2">
-            <a:extLst>
-              <a:ext uri="{FF2B5EF4-FFF2-40B4-BE49-F238E27FC236}">
-                <a16:creationId xmlns:a16="http://schemas.microsoft.com/office/drawing/2014/main" id="{49A0ED3D-C255-4BDA-86BA-ACBB509FEC25}"/>
-              </a:ext>
-            </a:extLst>
-          </p:cNvPr>
-          <p:cNvSpPr>
-            <a:spLocks noGrp="1"/>
-          </p:cNvSpPr>
-          <p:nvPr>
-            <p:ph idx="1"/>
-          </p:nvPr>
-        </p:nvSpPr>
-        <p:spPr/>
-        <p:txBody>
-          <a:bodyPr/>
-          <a:lstStyle/>
-          <a:p>
-            <a:r>
-              <a:rPr lang="en-US" dirty="0"/>
-              <a:t>Sampling distribution (data as proxy)</a:t>
-            </a:r>
-          </a:p>
-          <a:p>
-            <a:r>
-              <a:rPr lang="en-US" dirty="0"/>
-              <a:t>Residuals of model</a:t>
-            </a:r>
-          </a:p>
-          <a:p>
-            <a:r>
-              <a:rPr lang="en-US" dirty="0"/>
-              <a:t>Normality at each level of predictor (not outcome overall)</a:t>
-            </a:r>
-          </a:p>
-          <a:p>
-            <a:r>
-              <a:rPr lang="en-US" dirty="0"/>
-              <a:t>Large sample size (30 or more)</a:t>
-            </a:r>
-          </a:p>
-          <a:p>
-            <a:r>
-              <a:rPr lang="en-US" dirty="0"/>
-              <a:t>Plots</a:t>
-            </a:r>
-          </a:p>
-          <a:p>
-            <a:r>
-              <a:rPr lang="en-US" dirty="0"/>
-              <a:t>Skewness/Kurtosis</a:t>
-            </a:r>
-          </a:p>
-          <a:p>
-            <a:r>
-              <a:rPr lang="en-US" dirty="0"/>
-              <a:t>Kolmogorov-Smirnov (Shapiro-Wilk) test</a:t>
-            </a:r>
-          </a:p>
-        </p:txBody>
-      </p:sp>
-    </p:spTree>
-    <p:extLst>
-      <p:ext uri="{BB962C8B-B14F-4D97-AF65-F5344CB8AC3E}">
-        <p14:creationId xmlns:p14="http://schemas.microsoft.com/office/powerpoint/2010/main" val="3712924485"/>
-      </p:ext>
-    </p:extLst>
-  </p:cSld>
-  <p:clrMapOvr>
-    <a:masterClrMapping/>
-  </p:clrMapOvr>
-</p:sld>
-</file>
-
-<file path=ppt/slides/slide14.xml><?xml version="1.0" encoding="utf-8"?>
-<p:sld xmlns:a="http://schemas.openxmlformats.org/drawingml/2006/main" xmlns:r="http://schemas.openxmlformats.org/officeDocument/2006/relationships" xmlns:p="http://schemas.openxmlformats.org/presentationml/2006/main">
-  <p:cSld>
-    <p:spTree>
-      <p:nvGrpSpPr>
-        <p:cNvPr id="1" name=""/>
-        <p:cNvGrpSpPr/>
-        <p:nvPr/>
-      </p:nvGrpSpPr>
-      <p:grpSpPr>
-        <a:xfrm>
-          <a:off x="0" y="0"/>
-          <a:ext cx="0" cy="0"/>
-          <a:chOff x="0" y="0"/>
-          <a:chExt cx="0" cy="0"/>
-        </a:xfrm>
-      </p:grpSpPr>
-      <p:sp>
-        <p:nvSpPr>
-          <p:cNvPr id="2" name="Title 1">
-            <a:extLst>
-              <a:ext uri="{FF2B5EF4-FFF2-40B4-BE49-F238E27FC236}">
-                <a16:creationId xmlns:a16="http://schemas.microsoft.com/office/drawing/2014/main" id="{CF6FE0D1-F184-44B3-8E41-B302ACDC6029}"/>
-              </a:ext>
-            </a:extLst>
-          </p:cNvPr>
-          <p:cNvSpPr>
-            <a:spLocks noGrp="1"/>
-          </p:cNvSpPr>
-          <p:nvPr>
-            <p:ph type="title"/>
-          </p:nvPr>
-        </p:nvSpPr>
-        <p:spPr/>
-        <p:txBody>
-          <a:bodyPr/>
-          <a:lstStyle/>
-          <a:p>
-            <a:r>
-              <a:rPr lang="en-US" dirty="0"/>
-              <a:t>Independence</a:t>
-            </a:r>
-          </a:p>
-        </p:txBody>
-      </p:sp>
-      <p:sp>
-        <p:nvSpPr>
-          <p:cNvPr id="3" name="Content Placeholder 2">
-            <a:extLst>
-              <a:ext uri="{FF2B5EF4-FFF2-40B4-BE49-F238E27FC236}">
-                <a16:creationId xmlns:a16="http://schemas.microsoft.com/office/drawing/2014/main" id="{4E4E225A-C512-4766-A900-708342E7E64B}"/>
-              </a:ext>
-            </a:extLst>
-          </p:cNvPr>
-          <p:cNvSpPr>
-            <a:spLocks noGrp="1"/>
-          </p:cNvSpPr>
-          <p:nvPr>
-            <p:ph idx="1"/>
-          </p:nvPr>
-        </p:nvSpPr>
-        <p:spPr/>
-        <p:txBody>
-          <a:bodyPr/>
-          <a:lstStyle/>
-          <a:p>
-            <a:r>
-              <a:rPr lang="en-US" dirty="0"/>
-              <a:t>Study design</a:t>
-            </a:r>
-          </a:p>
-        </p:txBody>
-      </p:sp>
-    </p:spTree>
-    <p:extLst>
-      <p:ext uri="{BB962C8B-B14F-4D97-AF65-F5344CB8AC3E}">
-        <p14:creationId xmlns:p14="http://schemas.microsoft.com/office/powerpoint/2010/main" val="505025984"/>
-      </p:ext>
-    </p:extLst>
-  </p:cSld>
-  <p:clrMapOvr>
-    <a:masterClrMapping/>
-  </p:clrMapOvr>
-</p:sld>
-</file>
-
-<file path=ppt/slides/slide15.xml><?xml version="1.0" encoding="utf-8"?>
-<p:sld xmlns:a="http://schemas.openxmlformats.org/drawingml/2006/main" xmlns:r="http://schemas.openxmlformats.org/officeDocument/2006/relationships" xmlns:p="http://schemas.openxmlformats.org/presentationml/2006/main">
-  <p:cSld>
-    <p:spTree>
-      <p:nvGrpSpPr>
-        <p:cNvPr id="1" name=""/>
-        <p:cNvGrpSpPr/>
-        <p:nvPr/>
-      </p:nvGrpSpPr>
-      <p:grpSpPr>
-        <a:xfrm>
-          <a:off x="0" y="0"/>
-          <a:ext cx="0" cy="0"/>
-          <a:chOff x="0" y="0"/>
-          <a:chExt cx="0" cy="0"/>
-        </a:xfrm>
-      </p:grpSpPr>
-      <p:sp>
-        <p:nvSpPr>
-          <p:cNvPr id="2" name="Title 1">
-            <a:extLst>
-              <a:ext uri="{FF2B5EF4-FFF2-40B4-BE49-F238E27FC236}">
-                <a16:creationId xmlns:a16="http://schemas.microsoft.com/office/drawing/2014/main" id="{61D34626-F7BD-44BD-B804-C009A4A9A92E}"/>
-              </a:ext>
-            </a:extLst>
-          </p:cNvPr>
-          <p:cNvSpPr>
-            <a:spLocks noGrp="1"/>
-          </p:cNvSpPr>
-          <p:nvPr>
-            <p:ph type="title"/>
-          </p:nvPr>
-        </p:nvSpPr>
-        <p:spPr/>
-        <p:txBody>
-          <a:bodyPr/>
-          <a:lstStyle/>
-          <a:p>
-            <a:r>
-              <a:rPr lang="en-US"/>
-              <a:t>Missing Data</a:t>
-            </a:r>
-          </a:p>
-        </p:txBody>
-      </p:sp>
-      <p:sp>
-        <p:nvSpPr>
-          <p:cNvPr id="3" name="Content Placeholder 2">
-            <a:extLst>
-              <a:ext uri="{FF2B5EF4-FFF2-40B4-BE49-F238E27FC236}">
-                <a16:creationId xmlns:a16="http://schemas.microsoft.com/office/drawing/2014/main" id="{21940502-2DE7-4299-A3AB-962D732AC37D}"/>
-              </a:ext>
-            </a:extLst>
-          </p:cNvPr>
-          <p:cNvSpPr>
-            <a:spLocks noGrp="1"/>
-          </p:cNvSpPr>
-          <p:nvPr>
-            <p:ph idx="1"/>
-          </p:nvPr>
-        </p:nvSpPr>
-        <p:spPr/>
-        <p:txBody>
-          <a:bodyPr/>
-          <a:lstStyle/>
-          <a:p>
-            <a:endParaRPr lang="en-US"/>
-          </a:p>
-        </p:txBody>
-      </p:sp>
-    </p:spTree>
-    <p:extLst>
-      <p:ext uri="{BB962C8B-B14F-4D97-AF65-F5344CB8AC3E}">
-        <p14:creationId xmlns:p14="http://schemas.microsoft.com/office/powerpoint/2010/main" val="1694622546"/>
-      </p:ext>
-    </p:extLst>
-  </p:cSld>
-  <p:clrMapOvr>
-    <a:masterClrMapping/>
-  </p:clrMapOvr>
-</p:sld>
-</file>
-
-<file path=ppt/slides/slide2.xml><?xml version="1.0" encoding="utf-8"?>
-<p:sld xmlns:a="http://schemas.openxmlformats.org/drawingml/2006/main" xmlns:r="http://schemas.openxmlformats.org/officeDocument/2006/relationships" xmlns:p="http://schemas.openxmlformats.org/presentationml/2006/main">
-  <p:cSld>
-    <p:spTree>
-      <p:nvGrpSpPr>
-        <p:cNvPr id="1" name=""/>
-        <p:cNvGrpSpPr/>
-        <p:nvPr/>
-      </p:nvGrpSpPr>
-      <p:grpSpPr>
-        <a:xfrm>
-          <a:off x="0" y="0"/>
-          <a:ext cx="0" cy="0"/>
-          <a:chOff x="0" y="0"/>
-          <a:chExt cx="0" cy="0"/>
-        </a:xfrm>
-      </p:grpSpPr>
-      <p:sp>
-        <p:nvSpPr>
-          <p:cNvPr id="2" name="Title 1">
-            <a:extLst>
-              <a:ext uri="{FF2B5EF4-FFF2-40B4-BE49-F238E27FC236}">
-                <a16:creationId xmlns:a16="http://schemas.microsoft.com/office/drawing/2014/main" id="{EDFF7803-E8FA-478B-B1B4-4DD580E2DD72}"/>
-              </a:ext>
-            </a:extLst>
-          </p:cNvPr>
-          <p:cNvSpPr>
-            <a:spLocks noGrp="1"/>
-          </p:cNvSpPr>
-          <p:nvPr>
-            <p:ph type="title"/>
-          </p:nvPr>
-        </p:nvSpPr>
-        <p:spPr/>
-        <p:txBody>
-          <a:bodyPr/>
-          <a:lstStyle/>
-          <a:p>
-            <a:r>
-              <a:rPr lang="en-US" dirty="0"/>
-              <a:t>Load Data</a:t>
-            </a:r>
-          </a:p>
-        </p:txBody>
-      </p:sp>
-      <p:sp>
-        <p:nvSpPr>
-          <p:cNvPr id="3" name="Content Placeholder 2">
-            <a:extLst>
-              <a:ext uri="{FF2B5EF4-FFF2-40B4-BE49-F238E27FC236}">
-                <a16:creationId xmlns:a16="http://schemas.microsoft.com/office/drawing/2014/main" id="{89A696A5-087D-49BF-BF77-0F67C7CBBBB0}"/>
-              </a:ext>
-            </a:extLst>
-          </p:cNvPr>
-          <p:cNvSpPr>
-            <a:spLocks noGrp="1"/>
-          </p:cNvSpPr>
-          <p:nvPr>
-            <p:ph idx="1"/>
-          </p:nvPr>
-        </p:nvSpPr>
-        <p:spPr/>
-        <p:txBody>
-          <a:bodyPr/>
-          <a:lstStyle/>
-          <a:p>
-            <a:endParaRPr lang="en-US"/>
+        <p:spPr>
+          <a:xfrm>
+            <a:off x="4038600" y="4884873"/>
+            <a:ext cx="7188199" cy="1292090"/>
+          </a:xfrm>
+        </p:spPr>
+        <p:txBody>
+          <a:bodyPr>
+            <a:normAutofit fontScale="92500" lnSpcReduction="20000"/>
+          </a:bodyPr>
+          <a:lstStyle/>
+          <a:p>
+            <a:r>
+              <a:rPr lang="en-US" sz="1800" dirty="0"/>
+              <a:t>Last week we learned how to open a data set in </a:t>
+            </a:r>
+            <a:r>
+              <a:rPr lang="en-US" sz="1800" dirty="0" err="1"/>
+              <a:t>Rstudio</a:t>
+            </a:r>
+            <a:r>
+              <a:rPr lang="en-US" sz="1800" dirty="0"/>
+              <a:t>.</a:t>
+            </a:r>
+          </a:p>
+          <a:p>
+            <a:r>
+              <a:rPr lang="en-US" sz="1800" dirty="0"/>
+              <a:t>Before we can do anything meaningful with it we need to make sure it’s suitable to analyze.</a:t>
+            </a:r>
+          </a:p>
+          <a:p>
+            <a:r>
+              <a:rPr lang="en-US" sz="1800" dirty="0"/>
+              <a:t>Any mistakes in the data identified later in the analysis have to be corrected and the analysis has to be redone from scratch. This is important.</a:t>
+            </a:r>
           </a:p>
         </p:txBody>
       </p:sp>
@@ -4042,6 +3823,14 @@
 <file path=ppt/slides/slide3.xml><?xml version="1.0" encoding="utf-8"?>
 <p:sld xmlns:a="http://schemas.openxmlformats.org/drawingml/2006/main" xmlns:r="http://schemas.openxmlformats.org/officeDocument/2006/relationships" xmlns:p="http://schemas.openxmlformats.org/presentationml/2006/main">
   <p:cSld>
+    <p:bg>
+      <p:bgPr>
+        <a:solidFill>
+          <a:schemeClr val="bg1"/>
+        </a:solidFill>
+        <a:effectLst/>
+      </p:bgPr>
+    </p:bg>
     <p:spTree>
       <p:nvGrpSpPr>
         <p:cNvPr id="1" name=""/>
@@ -4061,7 +3850,7 @@
           <p:cNvPr id="2" name="Title 1">
             <a:extLst>
               <a:ext uri="{FF2B5EF4-FFF2-40B4-BE49-F238E27FC236}">
-                <a16:creationId xmlns:a16="http://schemas.microsoft.com/office/drawing/2014/main" id="{97FDD88C-63A2-4ED6-BEB6-D9C1F2BA77CE}"/>
+                <a16:creationId xmlns:a16="http://schemas.microsoft.com/office/drawing/2014/main" id="{DAF42950-959E-4BCA-97DD-07B007104825}"/>
               </a:ext>
             </a:extLst>
           </p:cNvPr>
@@ -4072,22 +3861,21 @@
             <p:ph type="title"/>
           </p:nvPr>
         </p:nvSpPr>
-        <p:spPr/>
-        <p:txBody>
-          <a:bodyPr/>
-          <a:lstStyle/>
-          <a:p>
-            <a:r>
-              <a:rPr lang="en-US" dirty="0"/>
-              <a:t>Variable types in </a:t>
-            </a:r>
-            <a:r>
-              <a:rPr lang="en-US" dirty="0" err="1"/>
-              <a:t>dataframe</a:t>
-            </a:r>
-            <a:r>
-              <a:rPr lang="en-US" dirty="0"/>
-              <a:t> correct</a:t>
+        <p:spPr>
+          <a:xfrm>
+            <a:off x="648929" y="629266"/>
+            <a:ext cx="3651467" cy="1676603"/>
+          </a:xfrm>
+        </p:spPr>
+        <p:txBody>
+          <a:bodyPr>
+            <a:normAutofit/>
+          </a:bodyPr>
+          <a:lstStyle/>
+          <a:p>
+            <a:r>
+              <a:rPr lang="en-US"/>
+              <a:t>Data Cleaning Steps</a:t>
             </a:r>
           </a:p>
         </p:txBody>
@@ -4097,7 +3885,7 @@
           <p:cNvPr id="3" name="Content Placeholder 2">
             <a:extLst>
               <a:ext uri="{FF2B5EF4-FFF2-40B4-BE49-F238E27FC236}">
-                <a16:creationId xmlns:a16="http://schemas.microsoft.com/office/drawing/2014/main" id="{2523BB42-C47F-4D67-97A2-D92C8413161D}"/>
+                <a16:creationId xmlns:a16="http://schemas.microsoft.com/office/drawing/2014/main" id="{3C9276C6-CFFD-447B-8490-9DB32A1CD01A}"/>
               </a:ext>
             </a:extLst>
           </p:cNvPr>
@@ -4108,19 +3896,89 @@
             <p:ph idx="1"/>
           </p:nvPr>
         </p:nvSpPr>
-        <p:spPr/>
-        <p:txBody>
-          <a:bodyPr/>
-          <a:lstStyle/>
-          <a:p>
-            <a:endParaRPr lang="en-US"/>
-          </a:p>
-        </p:txBody>
-      </p:sp>
+        <p:spPr>
+          <a:xfrm>
+            <a:off x="648931" y="2438400"/>
+            <a:ext cx="3651466" cy="3785419"/>
+          </a:xfrm>
+        </p:spPr>
+        <p:txBody>
+          <a:bodyPr>
+            <a:normAutofit/>
+          </a:bodyPr>
+          <a:lstStyle/>
+          <a:p>
+            <a:r>
+              <a:rPr lang="en-US" sz="1800"/>
+              <a:t>Dr. Erin M. Buchanan lists steps to take before analyzing data citing Tabachnick and Fidell (authors of a well-known advanced statistics text).</a:t>
+            </a:r>
+          </a:p>
+          <a:p>
+            <a:r>
+              <a:rPr lang="en-US" sz="1800"/>
+              <a:t>Check and fix accuracy of the data.</a:t>
+            </a:r>
+          </a:p>
+          <a:p>
+            <a:r>
+              <a:rPr lang="en-US" sz="1800"/>
+              <a:t>Assess and address missing data.</a:t>
+            </a:r>
+          </a:p>
+          <a:p>
+            <a:r>
+              <a:rPr lang="en-US" sz="1800"/>
+              <a:t>Examine and decide what to do with outliers.</a:t>
+            </a:r>
+          </a:p>
+          <a:p>
+            <a:r>
+              <a:rPr lang="en-US" sz="1800"/>
+              <a:t>Assess statistical assumptions.</a:t>
+            </a:r>
+          </a:p>
+        </p:txBody>
+      </p:sp>
+      <p:pic>
+        <p:nvPicPr>
+          <p:cNvPr id="5" name="Picture 4">
+            <a:extLst>
+              <a:ext uri="{FF2B5EF4-FFF2-40B4-BE49-F238E27FC236}">
+                <a16:creationId xmlns:a16="http://schemas.microsoft.com/office/drawing/2014/main" id="{5BAAF314-F13D-400A-95ED-44FFB0FB18BA}"/>
+              </a:ext>
+            </a:extLst>
+          </p:cNvPr>
+          <p:cNvPicPr>
+            <a:picLocks noChangeAspect="1"/>
+          </p:cNvPicPr>
+          <p:nvPr/>
+        </p:nvPicPr>
+        <p:blipFill rotWithShape="1">
+          <a:blip r:embed="rId2">
+            <a:extLst>
+              <a:ext uri="{28A0092B-C50C-407E-A947-70E740481C1C}">
+                <a14:useLocalDpi xmlns:a14="http://schemas.microsoft.com/office/drawing/2010/main" val="0"/>
+              </a:ext>
+            </a:extLst>
+          </a:blip>
+          <a:srcRect l="7581" r="19181"/>
+          <a:stretch/>
+        </p:blipFill>
+        <p:spPr>
+          <a:xfrm>
+            <a:off x="4639056" y="10"/>
+            <a:ext cx="7552944" cy="6857990"/>
+          </a:xfrm>
+          <a:prstGeom prst="rect">
+            <a:avLst/>
+          </a:prstGeom>
+          <a:effectLst/>
+        </p:spPr>
+      </p:pic>
     </p:spTree>
     <p:extLst>
       <p:ext uri="{BB962C8B-B14F-4D97-AF65-F5344CB8AC3E}">
-        <p14:creationId xmlns:p14="http://schemas.microsoft.com/office/powerpoint/2010/main" val="3397243919"/>
+        <p14:creationId xmlns:p14="http://schemas.microsoft.com/office/powerpoint/2010/main" val="1623471221"/>
       </p:ext>
     </p:extLst>
   </p:cSld>
@@ -4133,6 +3991,14 @@
 <file path=ppt/slides/slide4.xml><?xml version="1.0" encoding="utf-8"?>
 <p:sld xmlns:a="http://schemas.openxmlformats.org/drawingml/2006/main" xmlns:r="http://schemas.openxmlformats.org/officeDocument/2006/relationships" xmlns:p="http://schemas.openxmlformats.org/presentationml/2006/main">
   <p:cSld>
+    <p:bg>
+      <p:bgPr>
+        <a:solidFill>
+          <a:schemeClr val="bg1"/>
+        </a:solidFill>
+        <a:effectLst/>
+      </p:bgPr>
+    </p:bg>
     <p:spTree>
       <p:nvGrpSpPr>
         <p:cNvPr id="1" name=""/>
@@ -4147,12 +4013,134 @@
           <a:chExt cx="0" cy="0"/>
         </a:xfrm>
       </p:grpSpPr>
+      <p:pic>
+        <p:nvPicPr>
+          <p:cNvPr id="7" name="Picture 6">
+            <a:extLst>
+              <a:ext uri="{FF2B5EF4-FFF2-40B4-BE49-F238E27FC236}">
+                <a16:creationId xmlns:a16="http://schemas.microsoft.com/office/drawing/2014/main" id="{1A15D7D6-9CD5-496E-B1E9-9C1DD18775D4}"/>
+              </a:ext>
+            </a:extLst>
+          </p:cNvPr>
+          <p:cNvPicPr>
+            <a:picLocks noChangeAspect="1"/>
+          </p:cNvPicPr>
+          <p:nvPr/>
+        </p:nvPicPr>
+        <p:blipFill rotWithShape="1">
+          <a:blip r:embed="rId2">
+            <a:alphaModFix/>
+            <a:extLst>
+              <a:ext uri="{28A0092B-C50C-407E-A947-70E740481C1C}">
+                <a14:useLocalDpi xmlns:a14="http://schemas.microsoft.com/office/drawing/2010/main" val="0"/>
+              </a:ext>
+            </a:extLst>
+          </a:blip>
+          <a:srcRect t="8550" r="-2" b="7431"/>
+          <a:stretch/>
+        </p:blipFill>
+        <p:spPr>
+          <a:xfrm>
+            <a:off x="6083786" y="-168318"/>
+            <a:ext cx="6261330" cy="3932313"/>
+          </a:xfrm>
+          <a:prstGeom prst="rect">
+            <a:avLst/>
+          </a:prstGeom>
+          <a:effectLst>
+            <a:softEdge rad="533400"/>
+          </a:effectLst>
+        </p:spPr>
+      </p:pic>
+      <p:pic>
+        <p:nvPicPr>
+          <p:cNvPr id="5" name="Picture 4">
+            <a:extLst>
+              <a:ext uri="{FF2B5EF4-FFF2-40B4-BE49-F238E27FC236}">
+                <a16:creationId xmlns:a16="http://schemas.microsoft.com/office/drawing/2014/main" id="{C1197B97-EA6A-45C8-85C9-2381F2F3DC65}"/>
+              </a:ext>
+            </a:extLst>
+          </p:cNvPr>
+          <p:cNvPicPr>
+            <a:picLocks noChangeAspect="1"/>
+          </p:cNvPicPr>
+          <p:nvPr/>
+        </p:nvPicPr>
+        <p:blipFill rotWithShape="1">
+          <a:blip r:embed="rId3">
+            <a:extLst>
+              <a:ext uri="{28A0092B-C50C-407E-A947-70E740481C1C}">
+                <a14:useLocalDpi xmlns:a14="http://schemas.microsoft.com/office/drawing/2010/main" val="0"/>
+              </a:ext>
+            </a:extLst>
+          </a:blip>
+          <a:srcRect l="6863" r="16613"/>
+          <a:stretch/>
+        </p:blipFill>
+        <p:spPr>
+          <a:xfrm>
+            <a:off x="6089904" y="2487168"/>
+            <a:ext cx="6263640" cy="4215384"/>
+          </a:xfrm>
+          <a:prstGeom prst="rect">
+            <a:avLst/>
+          </a:prstGeom>
+          <a:effectLst>
+            <a:softEdge rad="533400"/>
+          </a:effectLst>
+        </p:spPr>
+      </p:pic>
+      <p:pic>
+        <p:nvPicPr>
+          <p:cNvPr id="12" name="Picture 11">
+            <a:extLst>
+              <a:ext uri="{FF2B5EF4-FFF2-40B4-BE49-F238E27FC236}">
+                <a16:creationId xmlns:a16="http://schemas.microsoft.com/office/drawing/2014/main" id="{22901FED-4FC9-4ED5-8123-C98BCD1616BA}"/>
+              </a:ext>
+              <a:ext uri="{C183D7F6-B498-43B3-948B-1728B52AA6E4}">
+                <adec:decorative xmlns:adec="http://schemas.microsoft.com/office/drawing/2017/decorative" val="1"/>
+              </a:ext>
+            </a:extLst>
+          </p:cNvPr>
+          <p:cNvPicPr>
+            <a:picLocks noGrp="1" noRot="1" noChangeAspect="1" noMove="1" noResize="1" noEditPoints="1" noAdjustHandles="1" noChangeArrowheads="1" noChangeShapeType="1" noCrop="1"/>
+          </p:cNvPicPr>
+          <p:nvPr>
+            <p:extLst>
+              <p:ext uri="{386F3935-93C4-4BCD-93E2-E3B085C9AB24}">
+                <p16:designElem xmlns:p16="http://schemas.microsoft.com/office/powerpoint/2015/main" val="1"/>
+              </p:ext>
+            </p:extLst>
+          </p:nvPr>
+        </p:nvPicPr>
+        <p:blipFill>
+          <a:blip r:embed="rId4">
+            <a:extLst>
+              <a:ext uri="{28A0092B-C50C-407E-A947-70E740481C1C}">
+                <a14:useLocalDpi xmlns:a14="http://schemas.microsoft.com/office/drawing/2010/main" val="0"/>
+              </a:ext>
+            </a:extLst>
+          </a:blip>
+          <a:stretch>
+            <a:fillRect/>
+          </a:stretch>
+        </p:blipFill>
+        <p:spPr>
+          <a:xfrm>
+            <a:off x="0" y="0"/>
+            <a:ext cx="12192000" cy="6858000"/>
+          </a:xfrm>
+          <a:prstGeom prst="rect">
+            <a:avLst/>
+          </a:prstGeom>
+        </p:spPr>
+      </p:pic>
       <p:sp>
         <p:nvSpPr>
           <p:cNvPr id="2" name="Title 1">
             <a:extLst>
               <a:ext uri="{FF2B5EF4-FFF2-40B4-BE49-F238E27FC236}">
-                <a16:creationId xmlns:a16="http://schemas.microsoft.com/office/drawing/2014/main" id="{C47A223A-2BA8-4CE0-99C9-9BD197FEBA0A}"/>
+                <a16:creationId xmlns:a16="http://schemas.microsoft.com/office/drawing/2014/main" id="{717956B8-B0EC-41F4-89DF-68609AAE06CD}"/>
               </a:ext>
             </a:extLst>
           </p:cNvPr>
@@ -4163,14 +4151,25 @@
             <p:ph type="title"/>
           </p:nvPr>
         </p:nvSpPr>
-        <p:spPr/>
-        <p:txBody>
-          <a:bodyPr/>
-          <a:lstStyle/>
-          <a:p>
-            <a:r>
-              <a:rPr lang="en-US" dirty="0"/>
-              <a:t>First Look at Data</a:t>
+        <p:spPr>
+          <a:xfrm>
+            <a:off x="804998" y="798445"/>
+            <a:ext cx="4803636" cy="1311664"/>
+          </a:xfrm>
+        </p:spPr>
+        <p:txBody>
+          <a:bodyPr>
+            <a:normAutofit/>
+          </a:bodyPr>
+          <a:lstStyle/>
+          <a:p>
+            <a:r>
+              <a:rPr lang="en-US" sz="4000">
+                <a:solidFill>
+                  <a:srgbClr val="000000"/>
+                </a:solidFill>
+              </a:rPr>
+              <a:t>Data Accuracy</a:t>
             </a:r>
           </a:p>
         </p:txBody>
@@ -4180,7 +4179,7 @@
           <p:cNvPr id="3" name="Content Placeholder 2">
             <a:extLst>
               <a:ext uri="{FF2B5EF4-FFF2-40B4-BE49-F238E27FC236}">
-                <a16:creationId xmlns:a16="http://schemas.microsoft.com/office/drawing/2014/main" id="{D25D1187-4969-40A8-A564-4075B5C9771B}"/>
+                <a16:creationId xmlns:a16="http://schemas.microsoft.com/office/drawing/2014/main" id="{62DEE093-05A1-4558-8050-584A7C4294E3}"/>
               </a:ext>
             </a:extLst>
           </p:cNvPr>
@@ -4191,19 +4190,124 @@
             <p:ph idx="1"/>
           </p:nvPr>
         </p:nvSpPr>
-        <p:spPr/>
-        <p:txBody>
-          <a:bodyPr/>
-          <a:lstStyle/>
-          <a:p>
-            <a:endParaRPr lang="en-US"/>
+        <p:spPr>
+          <a:xfrm>
+            <a:off x="804997" y="2272143"/>
+            <a:ext cx="4803637" cy="3788830"/>
+          </a:xfrm>
+        </p:spPr>
+        <p:txBody>
+          <a:bodyPr anchor="ctr">
+            <a:normAutofit fontScale="92500" lnSpcReduction="20000"/>
+          </a:bodyPr>
+          <a:lstStyle/>
+          <a:p>
+            <a:r>
+              <a:rPr lang="en-US" sz="2000" dirty="0">
+                <a:solidFill>
+                  <a:srgbClr val="000000"/>
+                </a:solidFill>
+              </a:rPr>
+              <a:t>Score instruments if needed</a:t>
+            </a:r>
+          </a:p>
+          <a:p>
+            <a:pPr lvl="1"/>
+            <a:r>
+              <a:rPr lang="en-US" sz="2000" dirty="0">
+                <a:solidFill>
+                  <a:srgbClr val="000000"/>
+                </a:solidFill>
+              </a:rPr>
+              <a:t>Reverse score items if needed</a:t>
+            </a:r>
+          </a:p>
+          <a:p>
+            <a:r>
+              <a:rPr lang="en-US" sz="2000" dirty="0">
+                <a:solidFill>
+                  <a:srgbClr val="000000"/>
+                </a:solidFill>
+              </a:rPr>
+              <a:t>Check for typos</a:t>
+            </a:r>
+          </a:p>
+          <a:p>
+            <a:r>
+              <a:rPr lang="en-US" sz="2000" dirty="0">
+                <a:solidFill>
+                  <a:srgbClr val="000000"/>
+                </a:solidFill>
+              </a:rPr>
+              <a:t>Look for nonsensical data</a:t>
+            </a:r>
+          </a:p>
+          <a:p>
+            <a:r>
+              <a:rPr lang="en-US" sz="2000" dirty="0">
+                <a:solidFill>
+                  <a:srgbClr val="000000"/>
+                </a:solidFill>
+              </a:rPr>
+              <a:t>Make sure data types are correct</a:t>
+            </a:r>
+          </a:p>
+          <a:p>
+            <a:r>
+              <a:rPr lang="en-US" sz="2000" dirty="0">
+                <a:solidFill>
+                  <a:srgbClr val="000000"/>
+                </a:solidFill>
+              </a:rPr>
+              <a:t>Convert variables to factors</a:t>
+            </a:r>
+          </a:p>
+          <a:p>
+            <a:r>
+              <a:rPr lang="en-US" sz="2000" dirty="0">
+                <a:solidFill>
+                  <a:srgbClr val="000000"/>
+                </a:solidFill>
+              </a:rPr>
+              <a:t>Check categories are appropriate</a:t>
+            </a:r>
+          </a:p>
+          <a:p>
+            <a:r>
+              <a:rPr lang="en-US" sz="2000" dirty="0">
+                <a:solidFill>
+                  <a:srgbClr val="000000"/>
+                </a:solidFill>
+              </a:rPr>
+              <a:t>Check counts in categories</a:t>
+            </a:r>
+          </a:p>
+          <a:p>
+            <a:r>
+              <a:rPr lang="en-US" sz="2000" dirty="0">
+                <a:solidFill>
+                  <a:srgbClr val="000000"/>
+                </a:solidFill>
+              </a:rPr>
+              <a:t>Correct problems if possible or delete so it’s missing</a:t>
+            </a:r>
+          </a:p>
+          <a:p>
+            <a:r>
+              <a:rPr lang="en-US" sz="2000" dirty="0">
+                <a:solidFill>
+                  <a:srgbClr val="000000"/>
+                </a:solidFill>
+              </a:rPr>
+              <a:t>Be transparent about problems encountered and how solved</a:t>
+            </a:r>
           </a:p>
         </p:txBody>
       </p:sp>
     </p:spTree>
     <p:extLst>
       <p:ext uri="{BB962C8B-B14F-4D97-AF65-F5344CB8AC3E}">
-        <p14:creationId xmlns:p14="http://schemas.microsoft.com/office/powerpoint/2010/main" val="184564316"/>
+        <p14:creationId xmlns:p14="http://schemas.microsoft.com/office/powerpoint/2010/main" val="1318690137"/>
       </p:ext>
     </p:extLst>
   </p:cSld>
@@ -4216,6 +4320,14 @@
 <file path=ppt/slides/slide5.xml><?xml version="1.0" encoding="utf-8"?>
 <p:sld xmlns:a="http://schemas.openxmlformats.org/drawingml/2006/main" xmlns:r="http://schemas.openxmlformats.org/officeDocument/2006/relationships" xmlns:p="http://schemas.openxmlformats.org/presentationml/2006/main">
   <p:cSld>
+    <p:bg>
+      <p:bgPr>
+        <a:solidFill>
+          <a:schemeClr val="bg1"/>
+        </a:solidFill>
+        <a:effectLst/>
+      </p:bgPr>
+    </p:bg>
     <p:spTree>
       <p:nvGrpSpPr>
         <p:cNvPr id="1" name=""/>
@@ -4235,7 +4347,7 @@
           <p:cNvPr id="2" name="Title 1">
             <a:extLst>
               <a:ext uri="{FF2B5EF4-FFF2-40B4-BE49-F238E27FC236}">
-                <a16:creationId xmlns:a16="http://schemas.microsoft.com/office/drawing/2014/main" id="{9FEF7EAE-9D1F-42C7-8BCE-64560C58A24E}"/>
+                <a16:creationId xmlns:a16="http://schemas.microsoft.com/office/drawing/2014/main" id="{00B3FCFF-C7B0-4A54-83F7-C4D9EEAB8921}"/>
               </a:ext>
             </a:extLst>
           </p:cNvPr>
@@ -4246,15 +4358,303 @@
             <p:ph type="title"/>
           </p:nvPr>
         </p:nvSpPr>
-        <p:spPr/>
-        <p:txBody>
-          <a:bodyPr/>
+        <p:spPr>
+          <a:xfrm>
+            <a:off x="1514292" y="513612"/>
+            <a:ext cx="9894133" cy="1031216"/>
+          </a:xfrm>
+        </p:spPr>
+        <p:txBody>
+          <a:bodyPr anchor="b">
+            <a:normAutofit/>
+          </a:bodyPr>
           <a:lstStyle/>
           <a:p>
             <a:r>
               <a:rPr lang="en-US" dirty="0"/>
-              <a:t>Clean Data Before Anything Else</a:t>
-            </a:r>
+              <a:t>How to Check Data</a:t>
+            </a:r>
+          </a:p>
+        </p:txBody>
+      </p:sp>
+      <p:pic>
+        <p:nvPicPr>
+          <p:cNvPr id="5" name="Picture 4">
+            <a:extLst>
+              <a:ext uri="{FF2B5EF4-FFF2-40B4-BE49-F238E27FC236}">
+                <a16:creationId xmlns:a16="http://schemas.microsoft.com/office/drawing/2014/main" id="{79244188-FC4E-4994-9275-8FE442C1DD30}"/>
+              </a:ext>
+            </a:extLst>
+          </p:cNvPr>
+          <p:cNvPicPr>
+            <a:picLocks noChangeAspect="1"/>
+          </p:cNvPicPr>
+          <p:nvPr/>
+        </p:nvPicPr>
+        <p:blipFill>
+          <a:blip r:embed="rId2">
+            <a:extLst>
+              <a:ext uri="{28A0092B-C50C-407E-A947-70E740481C1C}">
+                <a14:useLocalDpi xmlns:a14="http://schemas.microsoft.com/office/drawing/2010/main" val="0"/>
+              </a:ext>
+            </a:extLst>
+          </a:blip>
+          <a:stretch>
+            <a:fillRect/>
+          </a:stretch>
+        </p:blipFill>
+        <p:spPr>
+          <a:xfrm>
+            <a:off x="1977196" y="2589086"/>
+            <a:ext cx="4143575" cy="2755478"/>
+          </a:xfrm>
+          <a:prstGeom prst="rect">
+            <a:avLst/>
+          </a:prstGeom>
+        </p:spPr>
+      </p:pic>
+      <p:sp>
+        <p:nvSpPr>
+          <p:cNvPr id="10" name="Freeform: Shape 9">
+            <a:extLst>
+              <a:ext uri="{FF2B5EF4-FFF2-40B4-BE49-F238E27FC236}">
+                <a16:creationId xmlns:a16="http://schemas.microsoft.com/office/drawing/2014/main" id="{C607803A-4E99-444E-94F7-8785CDDF5849}"/>
+              </a:ext>
+              <a:ext uri="{C183D7F6-B498-43B3-948B-1728B52AA6E4}">
+                <adec:decorative xmlns:adec="http://schemas.microsoft.com/office/drawing/2017/decorative" val="1"/>
+              </a:ext>
+            </a:extLst>
+          </p:cNvPr>
+          <p:cNvSpPr>
+            <a:spLocks noGrp="1" noRot="1" noChangeAspect="1" noMove="1" noResize="1" noEditPoints="1" noAdjustHandles="1" noChangeArrowheads="1" noChangeShapeType="1" noTextEdit="1"/>
+          </p:cNvSpPr>
+          <p:nvPr>
+            <p:extLst>
+              <p:ext uri="{386F3935-93C4-4BCD-93E2-E3B085C9AB24}">
+                <p16:designElem xmlns:p16="http://schemas.microsoft.com/office/powerpoint/2015/main" val="1"/>
+              </p:ext>
+            </p:extLst>
+          </p:nvPr>
+        </p:nvSpPr>
+        <p:spPr bwMode="auto">
+          <a:xfrm flipH="1" flipV="1">
+            <a:off x="780154" y="1884045"/>
+            <a:ext cx="3275668" cy="2853308"/>
+          </a:xfrm>
+          <a:custGeom>
+            <a:avLst/>
+            <a:gdLst>
+              <a:gd name="connsiteX0" fmla="*/ 3275668 w 3275668"/>
+              <a:gd name="connsiteY0" fmla="*/ 2853308 h 2853308"/>
+              <a:gd name="connsiteX1" fmla="*/ 655 w 3275668"/>
+              <a:gd name="connsiteY1" fmla="*/ 2853308 h 2853308"/>
+              <a:gd name="connsiteX2" fmla="*/ 0 w 3275668"/>
+              <a:gd name="connsiteY2" fmla="*/ 2467565 h 2853308"/>
+              <a:gd name="connsiteX3" fmla="*/ 2869894 w 3275668"/>
+              <a:gd name="connsiteY3" fmla="*/ 2468888 h 2853308"/>
+              <a:gd name="connsiteX4" fmla="*/ 2869894 w 3275668"/>
+              <a:gd name="connsiteY4" fmla="*/ 0 h 2853308"/>
+              <a:gd name="connsiteX5" fmla="*/ 3275668 w 3275668"/>
+              <a:gd name="connsiteY5" fmla="*/ 0 h 2853308"/>
+            </a:gdLst>
+            <a:ahLst/>
+            <a:cxnLst>
+              <a:cxn ang="0">
+                <a:pos x="connsiteX0" y="connsiteY0"/>
+              </a:cxn>
+              <a:cxn ang="0">
+                <a:pos x="connsiteX1" y="connsiteY1"/>
+              </a:cxn>
+              <a:cxn ang="0">
+                <a:pos x="connsiteX2" y="connsiteY2"/>
+              </a:cxn>
+              <a:cxn ang="0">
+                <a:pos x="connsiteX3" y="connsiteY3"/>
+              </a:cxn>
+              <a:cxn ang="0">
+                <a:pos x="connsiteX4" y="connsiteY4"/>
+              </a:cxn>
+              <a:cxn ang="0">
+                <a:pos x="connsiteX5" y="connsiteY5"/>
+              </a:cxn>
+            </a:cxnLst>
+            <a:rect l="l" t="t" r="r" b="b"/>
+            <a:pathLst>
+              <a:path w="3275668" h="2853308">
+                <a:moveTo>
+                  <a:pt x="3275668" y="2853308"/>
+                </a:moveTo>
+                <a:lnTo>
+                  <a:pt x="655" y="2853308"/>
+                </a:lnTo>
+                <a:cubicBezTo>
+                  <a:pt x="-655" y="2720171"/>
+                  <a:pt x="1310" y="2600702"/>
+                  <a:pt x="0" y="2467565"/>
+                </a:cubicBezTo>
+                <a:lnTo>
+                  <a:pt x="2869894" y="2468888"/>
+                </a:lnTo>
+                <a:lnTo>
+                  <a:pt x="2869894" y="0"/>
+                </a:lnTo>
+                <a:lnTo>
+                  <a:pt x="3275668" y="0"/>
+                </a:lnTo>
+                <a:close/>
+              </a:path>
+            </a:pathLst>
+          </a:custGeom>
+          <a:solidFill>
+            <a:srgbClr val="4C4C4C"/>
+          </a:solidFill>
+          <a:ln w="0">
+            <a:noFill/>
+            <a:prstDash val="solid"/>
+            <a:round/>
+            <a:headEnd/>
+            <a:tailEnd/>
+          </a:ln>
+        </p:spPr>
+      </p:sp>
+      <p:sp>
+        <p:nvSpPr>
+          <p:cNvPr id="12" name="Freeform: Shape 11">
+            <a:extLst>
+              <a:ext uri="{FF2B5EF4-FFF2-40B4-BE49-F238E27FC236}">
+                <a16:creationId xmlns:a16="http://schemas.microsoft.com/office/drawing/2014/main" id="{2989BE6A-C309-418E-8ADD-1616A980570D}"/>
+              </a:ext>
+              <a:ext uri="{C183D7F6-B498-43B3-948B-1728B52AA6E4}">
+                <adec:decorative xmlns:adec="http://schemas.microsoft.com/office/drawing/2017/decorative" val="1"/>
+              </a:ext>
+            </a:extLst>
+          </p:cNvPr>
+          <p:cNvSpPr>
+            <a:spLocks noGrp="1" noRot="1" noChangeAspect="1" noMove="1" noResize="1" noEditPoints="1" noAdjustHandles="1" noChangeArrowheads="1" noChangeShapeType="1" noTextEdit="1"/>
+          </p:cNvSpPr>
+          <p:nvPr>
+            <p:extLst>
+              <p:ext uri="{386F3935-93C4-4BCD-93E2-E3B085C9AB24}">
+                <p16:designElem xmlns:p16="http://schemas.microsoft.com/office/powerpoint/2015/main" val="1"/>
+              </p:ext>
+            </p:extLst>
+          </p:nvPr>
+        </p:nvSpPr>
+        <p:spPr bwMode="auto">
+          <a:xfrm>
+            <a:off x="4055822" y="3222529"/>
+            <a:ext cx="3242952" cy="2828156"/>
+          </a:xfrm>
+          <a:custGeom>
+            <a:avLst/>
+            <a:gdLst>
+              <a:gd name="connsiteX0" fmla="*/ 2837178 w 3242952"/>
+              <a:gd name="connsiteY0" fmla="*/ 0 h 2828156"/>
+              <a:gd name="connsiteX1" fmla="*/ 3242952 w 3242952"/>
+              <a:gd name="connsiteY1" fmla="*/ 0 h 2828156"/>
+              <a:gd name="connsiteX2" fmla="*/ 3242952 w 3242952"/>
+              <a:gd name="connsiteY2" fmla="*/ 2828156 h 2828156"/>
+              <a:gd name="connsiteX3" fmla="*/ 0 w 3242952"/>
+              <a:gd name="connsiteY3" fmla="*/ 2828156 h 2828156"/>
+              <a:gd name="connsiteX4" fmla="*/ 0 w 3242952"/>
+              <a:gd name="connsiteY4" fmla="*/ 2442859 h 2828156"/>
+              <a:gd name="connsiteX5" fmla="*/ 2837178 w 3242952"/>
+              <a:gd name="connsiteY5" fmla="*/ 2443295 h 2828156"/>
+            </a:gdLst>
+            <a:ahLst/>
+            <a:cxnLst>
+              <a:cxn ang="0">
+                <a:pos x="connsiteX0" y="connsiteY0"/>
+              </a:cxn>
+              <a:cxn ang="0">
+                <a:pos x="connsiteX1" y="connsiteY1"/>
+              </a:cxn>
+              <a:cxn ang="0">
+                <a:pos x="connsiteX2" y="connsiteY2"/>
+              </a:cxn>
+              <a:cxn ang="0">
+                <a:pos x="connsiteX3" y="connsiteY3"/>
+              </a:cxn>
+              <a:cxn ang="0">
+                <a:pos x="connsiteX4" y="connsiteY4"/>
+              </a:cxn>
+              <a:cxn ang="0">
+                <a:pos x="connsiteX5" y="connsiteY5"/>
+              </a:cxn>
+            </a:cxnLst>
+            <a:rect l="l" t="t" r="r" b="b"/>
+            <a:pathLst>
+              <a:path w="3242952" h="2828156">
+                <a:moveTo>
+                  <a:pt x="2837178" y="0"/>
+                </a:moveTo>
+                <a:lnTo>
+                  <a:pt x="3242952" y="0"/>
+                </a:lnTo>
+                <a:lnTo>
+                  <a:pt x="3242952" y="2828156"/>
+                </a:lnTo>
+                <a:lnTo>
+                  <a:pt x="0" y="2828156"/>
+                </a:lnTo>
+                <a:lnTo>
+                  <a:pt x="0" y="2442859"/>
+                </a:lnTo>
+                <a:lnTo>
+                  <a:pt x="2837178" y="2443295"/>
+                </a:lnTo>
+                <a:close/>
+              </a:path>
+            </a:pathLst>
+          </a:custGeom>
+          <a:solidFill>
+            <a:srgbClr val="4C4C4C"/>
+          </a:solidFill>
+          <a:ln w="0">
+            <a:noFill/>
+            <a:prstDash val="solid"/>
+            <a:round/>
+            <a:headEnd/>
+            <a:tailEnd/>
+          </a:ln>
+        </p:spPr>
+        <p:txBody>
+          <a:bodyPr wrap="square">
+            <a:noAutofit/>
+          </a:bodyPr>
+          <a:lstStyle/>
+          <a:p>
+            <a:pPr marL="0" marR="0" lvl="0" indent="0" algn="l" defTabSz="914400" rtl="0" eaLnBrk="1" fontAlgn="auto" latinLnBrk="0" hangingPunct="1">
+              <a:lnSpc>
+                <a:spcPct val="100000"/>
+              </a:lnSpc>
+              <a:spcBef>
+                <a:spcPts val="0"/>
+              </a:spcBef>
+              <a:spcAft>
+                <a:spcPts val="0"/>
+              </a:spcAft>
+              <a:buClrTx/>
+              <a:buSzTx/>
+              <a:buFontTx/>
+              <a:buNone/>
+              <a:tabLst/>
+              <a:defRPr/>
+            </a:pPr>
+            <a:endParaRPr kumimoji="0" lang="en-US" sz="1800" b="0" i="0" u="none" strike="noStrike" kern="1200" cap="none" spc="0" normalizeH="0" baseline="0" noProof="0">
+              <a:ln>
+                <a:noFill/>
+              </a:ln>
+              <a:solidFill>
+                <a:prstClr val="black"/>
+              </a:solidFill>
+              <a:effectLst/>
+              <a:uLnTx/>
+              <a:uFillTx/>
+              <a:latin typeface="Calibri" panose="020F0502020204030204"/>
+              <a:ea typeface="+mn-ea"/>
+              <a:cs typeface="+mn-cs"/>
+            </a:endParaRPr>
           </a:p>
         </p:txBody>
       </p:sp>
@@ -4263,7 +4663,7 @@
           <p:cNvPr id="3" name="Content Placeholder 2">
             <a:extLst>
               <a:ext uri="{FF2B5EF4-FFF2-40B4-BE49-F238E27FC236}">
-                <a16:creationId xmlns:a16="http://schemas.microsoft.com/office/drawing/2014/main" id="{9F566DA5-E92B-4F57-BC91-B62102A85CBE}"/>
+                <a16:creationId xmlns:a16="http://schemas.microsoft.com/office/drawing/2014/main" id="{895B77A7-9F68-4182-A7F0-80B151A4915B}"/>
               </a:ext>
             </a:extLst>
           </p:cNvPr>
@@ -4274,19 +4674,53 @@
             <p:ph idx="1"/>
           </p:nvPr>
         </p:nvSpPr>
-        <p:spPr/>
-        <p:txBody>
-          <a:bodyPr/>
-          <a:lstStyle/>
-          <a:p>
-            <a:endParaRPr lang="en-US"/>
+        <p:spPr>
+          <a:xfrm>
+            <a:off x="7781373" y="2279151"/>
+            <a:ext cx="3627063" cy="3387145"/>
+          </a:xfrm>
+        </p:spPr>
+        <p:txBody>
+          <a:bodyPr anchor="ctr">
+            <a:normAutofit/>
+          </a:bodyPr>
+          <a:lstStyle/>
+          <a:p>
+            <a:r>
+              <a:rPr lang="en-US" sz="2400"/>
+              <a:t>Data viewer in Rstudio View()</a:t>
+            </a:r>
+          </a:p>
+          <a:p>
+            <a:r>
+              <a:rPr lang="en-US" sz="2400"/>
+              <a:t>Histograms</a:t>
+            </a:r>
+          </a:p>
+          <a:p>
+            <a:r>
+              <a:rPr lang="en-US" sz="2400"/>
+              <a:t>Box plots</a:t>
+            </a:r>
+          </a:p>
+          <a:p>
+            <a:r>
+              <a:rPr lang="en-US" sz="2400"/>
+              <a:t>Scatter plots</a:t>
+            </a:r>
+          </a:p>
+          <a:p>
+            <a:r>
+              <a:rPr lang="en-US" sz="2400"/>
+              <a:t>Descriptive statistics</a:t>
+            </a:r>
           </a:p>
         </p:txBody>
       </p:sp>
     </p:spTree>
     <p:extLst>
       <p:ext uri="{BB962C8B-B14F-4D97-AF65-F5344CB8AC3E}">
-        <p14:creationId xmlns:p14="http://schemas.microsoft.com/office/powerpoint/2010/main" val="66017688"/>
+        <p14:creationId xmlns:p14="http://schemas.microsoft.com/office/powerpoint/2010/main" val="2909979429"/>
       </p:ext>
     </p:extLst>
   </p:cSld>
@@ -4299,6 +4733,14 @@
 <file path=ppt/slides/slide6.xml><?xml version="1.0" encoding="utf-8"?>
 <p:sld xmlns:a="http://schemas.openxmlformats.org/drawingml/2006/main" xmlns:r="http://schemas.openxmlformats.org/officeDocument/2006/relationships" xmlns:p="http://schemas.openxmlformats.org/presentationml/2006/main">
   <p:cSld>
+    <p:bg>
+      <p:bgPr>
+        <a:solidFill>
+          <a:schemeClr val="bg1"/>
+        </a:solidFill>
+        <a:effectLst/>
+      </p:bgPr>
+    </p:bg>
     <p:spTree>
       <p:nvGrpSpPr>
         <p:cNvPr id="1" name=""/>
@@ -4318,7 +4760,7 @@
           <p:cNvPr id="2" name="Title 1">
             <a:extLst>
               <a:ext uri="{FF2B5EF4-FFF2-40B4-BE49-F238E27FC236}">
-                <a16:creationId xmlns:a16="http://schemas.microsoft.com/office/drawing/2014/main" id="{16D864C8-DBAE-4316-B6E9-A24FE8676537}"/>
+                <a16:creationId xmlns:a16="http://schemas.microsoft.com/office/drawing/2014/main" id="{31E18B9B-8B67-440B-8147-13FB44F01B71}"/>
               </a:ext>
             </a:extLst>
           </p:cNvPr>
@@ -4329,14 +4771,21 @@
             <p:ph type="title"/>
           </p:nvPr>
         </p:nvSpPr>
-        <p:spPr/>
-        <p:txBody>
-          <a:bodyPr/>
+        <p:spPr>
+          <a:xfrm>
+            <a:off x="648929" y="629266"/>
+            <a:ext cx="5127031" cy="1676603"/>
+          </a:xfrm>
+        </p:spPr>
+        <p:txBody>
+          <a:bodyPr>
+            <a:normAutofit/>
+          </a:bodyPr>
           <a:lstStyle/>
           <a:p>
             <a:r>
               <a:rPr lang="en-US" dirty="0"/>
-              <a:t>Don’t Rush to Analysis</a:t>
+              <a:t>Missing Data</a:t>
             </a:r>
           </a:p>
         </p:txBody>
@@ -4346,7 +4795,7 @@
           <p:cNvPr id="3" name="Content Placeholder 2">
             <a:extLst>
               <a:ext uri="{FF2B5EF4-FFF2-40B4-BE49-F238E27FC236}">
-                <a16:creationId xmlns:a16="http://schemas.microsoft.com/office/drawing/2014/main" id="{990DA118-6946-4598-AD29-7079705EDDBF}"/>
+                <a16:creationId xmlns:a16="http://schemas.microsoft.com/office/drawing/2014/main" id="{55504C2F-FC26-43FC-A6DD-0203A5B861F7}"/>
               </a:ext>
             </a:extLst>
           </p:cNvPr>
@@ -4357,19 +4806,131 @@
             <p:ph idx="1"/>
           </p:nvPr>
         </p:nvSpPr>
-        <p:spPr/>
-        <p:txBody>
-          <a:bodyPr/>
-          <a:lstStyle/>
-          <a:p>
-            <a:endParaRPr lang="en-US"/>
-          </a:p>
-        </p:txBody>
-      </p:sp>
+        <p:spPr>
+          <a:xfrm>
+            <a:off x="648930" y="2438400"/>
+            <a:ext cx="5127029" cy="3785419"/>
+          </a:xfrm>
+        </p:spPr>
+        <p:txBody>
+          <a:bodyPr>
+            <a:normAutofit fontScale="92500" lnSpcReduction="20000"/>
+          </a:bodyPr>
+          <a:lstStyle/>
+          <a:p>
+            <a:r>
+              <a:rPr lang="en-US" sz="1900" dirty="0"/>
+              <a:t>Complex topic</a:t>
+            </a:r>
+          </a:p>
+          <a:p>
+            <a:r>
+              <a:rPr lang="en-US" sz="1900" dirty="0"/>
+              <a:t>R for Data Science 5.2.3, 7.4</a:t>
+            </a:r>
+          </a:p>
+          <a:p>
+            <a:r>
+              <a:rPr lang="en-US" sz="1900" dirty="0"/>
+              <a:t>Missing Completely at Random (MCAR) is good</a:t>
+            </a:r>
+          </a:p>
+          <a:p>
+            <a:pPr lvl="1"/>
+            <a:r>
+              <a:rPr lang="en-US" sz="1900" dirty="0"/>
+              <a:t>Accidental mistake here and there </a:t>
+            </a:r>
+            <a:br>
+              <a:rPr lang="en-US" sz="1900" dirty="0"/>
+            </a:br>
+            <a:r>
+              <a:rPr lang="en-US" sz="1900" dirty="0"/>
+              <a:t>(no pattern)</a:t>
+            </a:r>
+          </a:p>
+          <a:p>
+            <a:r>
+              <a:rPr lang="en-US" sz="1900" dirty="0"/>
+              <a:t>Missing Not at Random (MNAR) is bad</a:t>
+            </a:r>
+          </a:p>
+          <a:p>
+            <a:pPr lvl="1"/>
+            <a:r>
+              <a:rPr lang="en-US" sz="1900" dirty="0"/>
+              <a:t>Something happened for specific reason (pattern)</a:t>
+            </a:r>
+          </a:p>
+          <a:p>
+            <a:r>
+              <a:rPr lang="en-US" sz="1900" dirty="0"/>
+              <a:t>Choose to exclude from analysis or impute</a:t>
+            </a:r>
+          </a:p>
+          <a:p>
+            <a:pPr lvl="1"/>
+            <a:r>
+              <a:rPr lang="en-US" sz="1900" dirty="0"/>
+              <a:t>Imputing &lt; 5% of large data set considered acceptable</a:t>
+            </a:r>
+          </a:p>
+          <a:p>
+            <a:pPr lvl="1"/>
+            <a:r>
+              <a:rPr lang="en-US" sz="1900" dirty="0"/>
+              <a:t>&gt; 5% missing or small data set – imputation probably shouldn’t be done</a:t>
+            </a:r>
+          </a:p>
+          <a:p>
+            <a:pPr lvl="1"/>
+            <a:r>
+              <a:rPr lang="en-US" sz="1900" dirty="0"/>
+              <a:t>We won’t impute in this course (complex)</a:t>
+            </a:r>
+          </a:p>
+        </p:txBody>
+      </p:sp>
+      <p:pic>
+        <p:nvPicPr>
+          <p:cNvPr id="5" name="Picture 4">
+            <a:extLst>
+              <a:ext uri="{FF2B5EF4-FFF2-40B4-BE49-F238E27FC236}">
+                <a16:creationId xmlns:a16="http://schemas.microsoft.com/office/drawing/2014/main" id="{12A86227-1113-4C2F-8A63-CD134A2179FD}"/>
+              </a:ext>
+            </a:extLst>
+          </p:cNvPr>
+          <p:cNvPicPr>
+            <a:picLocks noChangeAspect="1"/>
+          </p:cNvPicPr>
+          <p:nvPr/>
+        </p:nvPicPr>
+        <p:blipFill rotWithShape="1">
+          <a:blip r:embed="rId2">
+            <a:extLst>
+              <a:ext uri="{28A0092B-C50C-407E-A947-70E740481C1C}">
+                <a14:useLocalDpi xmlns:a14="http://schemas.microsoft.com/office/drawing/2010/main" val="0"/>
+              </a:ext>
+            </a:extLst>
+          </a:blip>
+          <a:srcRect r="24379" b="2"/>
+          <a:stretch/>
+        </p:blipFill>
+        <p:spPr>
+          <a:xfrm>
+            <a:off x="6090612" y="10"/>
+            <a:ext cx="6101387" cy="6857990"/>
+          </a:xfrm>
+          <a:prstGeom prst="rect">
+            <a:avLst/>
+          </a:prstGeom>
+          <a:effectLst/>
+        </p:spPr>
+      </p:pic>
     </p:spTree>
     <p:extLst>
       <p:ext uri="{BB962C8B-B14F-4D97-AF65-F5344CB8AC3E}">
-        <p14:creationId xmlns:p14="http://schemas.microsoft.com/office/powerpoint/2010/main" val="2640047718"/>
+        <p14:creationId xmlns:p14="http://schemas.microsoft.com/office/powerpoint/2010/main" val="1958392255"/>
       </p:ext>
     </p:extLst>
   </p:cSld>
@@ -4382,6 +4943,14 @@
 <file path=ppt/slides/slide7.xml><?xml version="1.0" encoding="utf-8"?>
 <p:sld xmlns:a="http://schemas.openxmlformats.org/drawingml/2006/main" xmlns:r="http://schemas.openxmlformats.org/officeDocument/2006/relationships" xmlns:p="http://schemas.openxmlformats.org/presentationml/2006/main">
   <p:cSld>
+    <p:bg>
+      <p:bgPr>
+        <a:solidFill>
+          <a:schemeClr val="bg1"/>
+        </a:solidFill>
+        <a:effectLst/>
+      </p:bgPr>
+    </p:bg>
     <p:spTree>
       <p:nvGrpSpPr>
         <p:cNvPr id="1" name=""/>
@@ -4398,10 +4967,10 @@
       </p:grpSpPr>
       <p:sp>
         <p:nvSpPr>
-          <p:cNvPr id="4" name="Title 3">
-            <a:extLst>
-              <a:ext uri="{FF2B5EF4-FFF2-40B4-BE49-F238E27FC236}">
-                <a16:creationId xmlns:a16="http://schemas.microsoft.com/office/drawing/2014/main" id="{34BC0E04-4E92-4BB1-B6A5-11E21A0FB469}"/>
+          <p:cNvPr id="2" name="Title 1">
+            <a:extLst>
+              <a:ext uri="{FF2B5EF4-FFF2-40B4-BE49-F238E27FC236}">
+                <a16:creationId xmlns:a16="http://schemas.microsoft.com/office/drawing/2014/main" id="{75F1CD42-C951-4EEC-98F7-EFF604C1790D}"/>
               </a:ext>
             </a:extLst>
           </p:cNvPr>
@@ -4412,200 +4981,273 @@
             <p:ph type="title"/>
           </p:nvPr>
         </p:nvSpPr>
-        <p:spPr/>
-        <p:txBody>
-          <a:bodyPr/>
-          <a:lstStyle/>
-          <a:p>
-            <a:r>
-              <a:rPr lang="en-US" dirty="0"/>
-              <a:t>Graphs</a:t>
-            </a:r>
-          </a:p>
-        </p:txBody>
-      </p:sp>
-      <p:sp>
-        <p:nvSpPr>
-          <p:cNvPr id="5" name="Text Placeholder 4">
-            <a:extLst>
-              <a:ext uri="{FF2B5EF4-FFF2-40B4-BE49-F238E27FC236}">
-                <a16:creationId xmlns:a16="http://schemas.microsoft.com/office/drawing/2014/main" id="{AB72C457-A3F7-449F-A2EA-569CBF6C5301}"/>
-              </a:ext>
-            </a:extLst>
-          </p:cNvPr>
-          <p:cNvSpPr>
-            <a:spLocks noGrp="1"/>
-          </p:cNvSpPr>
-          <p:nvPr>
-            <p:ph type="body" idx="1"/>
-          </p:nvPr>
-        </p:nvSpPr>
-        <p:spPr/>
-        <p:txBody>
-          <a:bodyPr/>
-          <a:lstStyle/>
-          <a:p>
-            <a:r>
-              <a:rPr lang="en-US" dirty="0"/>
-              <a:t>Do</a:t>
-            </a:r>
-          </a:p>
-        </p:txBody>
-      </p:sp>
-      <p:sp>
-        <p:nvSpPr>
-          <p:cNvPr id="6" name="Content Placeholder 5">
-            <a:extLst>
-              <a:ext uri="{FF2B5EF4-FFF2-40B4-BE49-F238E27FC236}">
-                <a16:creationId xmlns:a16="http://schemas.microsoft.com/office/drawing/2014/main" id="{541D7C99-7FF9-4267-A4C1-B681D2263BEF}"/>
-              </a:ext>
-            </a:extLst>
-          </p:cNvPr>
-          <p:cNvSpPr>
-            <a:spLocks noGrp="1"/>
-          </p:cNvSpPr>
-          <p:nvPr>
-            <p:ph sz="half" idx="2"/>
-          </p:nvPr>
-        </p:nvSpPr>
-        <p:spPr/>
-        <p:txBody>
-          <a:bodyPr/>
-          <a:lstStyle/>
-          <a:p>
-            <a:r>
-              <a:rPr lang="en-US" dirty="0"/>
-              <a:t>Descriptive</a:t>
-            </a:r>
-          </a:p>
-          <a:p>
-            <a:pPr lvl="1"/>
-            <a:r>
-              <a:rPr lang="en-US" dirty="0"/>
-              <a:t>Labels</a:t>
-            </a:r>
-          </a:p>
-          <a:p>
-            <a:pPr lvl="1"/>
-            <a:r>
-              <a:rPr lang="en-US" dirty="0"/>
-              <a:t>Legends </a:t>
-            </a:r>
-          </a:p>
-          <a:p>
-            <a:r>
-              <a:rPr lang="en-US" dirty="0"/>
-              <a:t>Simple</a:t>
-            </a:r>
-          </a:p>
-          <a:p>
-            <a:pPr lvl="1"/>
-            <a:r>
-              <a:rPr lang="en-US" dirty="0"/>
-              <a:t>2 D</a:t>
-            </a:r>
-          </a:p>
-          <a:p>
-            <a:r>
-              <a:rPr lang="en-US" dirty="0"/>
-              <a:t>Realistic scales</a:t>
-            </a:r>
-          </a:p>
-        </p:txBody>
-      </p:sp>
-      <p:sp>
-        <p:nvSpPr>
-          <p:cNvPr id="7" name="Text Placeholder 6">
-            <a:extLst>
-              <a:ext uri="{FF2B5EF4-FFF2-40B4-BE49-F238E27FC236}">
-                <a16:creationId xmlns:a16="http://schemas.microsoft.com/office/drawing/2014/main" id="{E5BF192A-56B0-422D-B094-FAD0F130097A}"/>
-              </a:ext>
-            </a:extLst>
-          </p:cNvPr>
-          <p:cNvSpPr>
-            <a:spLocks noGrp="1"/>
-          </p:cNvSpPr>
-          <p:nvPr>
-            <p:ph type="body" sz="quarter" idx="3"/>
-          </p:nvPr>
-        </p:nvSpPr>
-        <p:spPr/>
-        <p:txBody>
-          <a:bodyPr/>
-          <a:lstStyle/>
-          <a:p>
-            <a:r>
-              <a:rPr lang="en-US" dirty="0"/>
-              <a:t>Don’t</a:t>
-            </a:r>
-          </a:p>
-        </p:txBody>
-      </p:sp>
-      <p:sp>
-        <p:nvSpPr>
-          <p:cNvPr id="8" name="Content Placeholder 7">
-            <a:extLst>
-              <a:ext uri="{FF2B5EF4-FFF2-40B4-BE49-F238E27FC236}">
-                <a16:creationId xmlns:a16="http://schemas.microsoft.com/office/drawing/2014/main" id="{9378A045-5507-49F0-A170-AA8CD82ACE2D}"/>
-              </a:ext>
-            </a:extLst>
-          </p:cNvPr>
-          <p:cNvSpPr>
-            <a:spLocks noGrp="1"/>
-          </p:cNvSpPr>
-          <p:nvPr>
-            <p:ph sz="quarter" idx="4"/>
-          </p:nvPr>
-        </p:nvSpPr>
-        <p:spPr/>
-        <p:txBody>
-          <a:bodyPr/>
-          <a:lstStyle/>
-          <a:p>
-            <a:r>
-              <a:rPr lang="en-US" dirty="0"/>
-              <a:t>Fancy/distracting</a:t>
-            </a:r>
-          </a:p>
-          <a:p>
-            <a:pPr lvl="1"/>
-            <a:r>
-              <a:rPr lang="en-US" dirty="0"/>
-              <a:t>Backgrounds</a:t>
-            </a:r>
-          </a:p>
-          <a:p>
-            <a:pPr lvl="1"/>
-            <a:r>
-              <a:rPr lang="en-US" dirty="0"/>
-              <a:t>Patterns</a:t>
-            </a:r>
-          </a:p>
-          <a:p>
-            <a:pPr lvl="1"/>
-            <a:r>
-              <a:rPr lang="en-US" dirty="0"/>
-              <a:t>Colors</a:t>
-            </a:r>
-          </a:p>
-          <a:p>
-            <a:r>
-              <a:rPr lang="en-US" dirty="0"/>
-              <a:t>Distorted scales</a:t>
-            </a:r>
-          </a:p>
-          <a:p>
-            <a:r>
-              <a:rPr lang="en-US" dirty="0"/>
-              <a:t>Lack of context</a:t>
-            </a:r>
-          </a:p>
-        </p:txBody>
-      </p:sp>
+        <p:spPr>
+          <a:xfrm>
+            <a:off x="648929" y="629266"/>
+            <a:ext cx="3667039" cy="1676603"/>
+          </a:xfrm>
+        </p:spPr>
+        <p:txBody>
+          <a:bodyPr>
+            <a:normAutofit/>
+          </a:bodyPr>
+          <a:lstStyle/>
+          <a:p>
+            <a:r>
+              <a:rPr lang="en-US" sz="4000"/>
+              <a:t>Outliers</a:t>
+            </a:r>
+          </a:p>
+        </p:txBody>
+      </p:sp>
+      <p:sp>
+        <p:nvSpPr>
+          <p:cNvPr id="3" name="Content Placeholder 2">
+            <a:extLst>
+              <a:ext uri="{FF2B5EF4-FFF2-40B4-BE49-F238E27FC236}">
+                <a16:creationId xmlns:a16="http://schemas.microsoft.com/office/drawing/2014/main" id="{E268BF80-D309-40A8-A38D-415D1FEFCE66}"/>
+              </a:ext>
+            </a:extLst>
+          </p:cNvPr>
+          <p:cNvSpPr>
+            <a:spLocks noGrp="1"/>
+          </p:cNvSpPr>
+          <p:nvPr>
+            <p:ph idx="1"/>
+          </p:nvPr>
+        </p:nvSpPr>
+        <p:spPr>
+          <a:xfrm>
+            <a:off x="648931" y="2438401"/>
+            <a:ext cx="3667036" cy="3779520"/>
+          </a:xfrm>
+        </p:spPr>
+        <p:txBody>
+          <a:bodyPr>
+            <a:normAutofit/>
+          </a:bodyPr>
+          <a:lstStyle/>
+          <a:p>
+            <a:r>
+              <a:rPr lang="en-US" sz="1800"/>
+              <a:t>We’ll talk more about outliers later</a:t>
+            </a:r>
+          </a:p>
+          <a:p>
+            <a:r>
+              <a:rPr lang="en-US" sz="1800"/>
+              <a:t>Univariate – z-scores</a:t>
+            </a:r>
+          </a:p>
+          <a:p>
+            <a:r>
+              <a:rPr lang="en-US" sz="1800"/>
+              <a:t>Multivariate – Mahalanobis distance</a:t>
+            </a:r>
+          </a:p>
+          <a:p>
+            <a:r>
+              <a:rPr lang="en-US" sz="1800"/>
+              <a:t>Plots</a:t>
+            </a:r>
+          </a:p>
+          <a:p>
+            <a:r>
+              <a:rPr lang="en-US" sz="1800"/>
+              <a:t>Need to decide to keep in analysis or drop</a:t>
+            </a:r>
+          </a:p>
+          <a:p>
+            <a:r>
+              <a:rPr lang="en-US" sz="1800"/>
+              <a:t>Have a justification</a:t>
+            </a:r>
+          </a:p>
+          <a:p>
+            <a:r>
+              <a:rPr lang="en-US" sz="1800"/>
+              <a:t>Be transparent</a:t>
+            </a:r>
+          </a:p>
+        </p:txBody>
+      </p:sp>
+      <p:sp>
+        <p:nvSpPr>
+          <p:cNvPr id="16" name="Rectangle 9">
+            <a:extLst>
+              <a:ext uri="{FF2B5EF4-FFF2-40B4-BE49-F238E27FC236}">
+                <a16:creationId xmlns:a16="http://schemas.microsoft.com/office/drawing/2014/main" id="{577D1452-F0B7-431E-9A24-D3F7103D8510}"/>
+              </a:ext>
+              <a:ext uri="{C183D7F6-B498-43B3-948B-1728B52AA6E4}">
+                <adec:decorative xmlns:adec="http://schemas.microsoft.com/office/drawing/2017/decorative" val="1"/>
+              </a:ext>
+            </a:extLst>
+          </p:cNvPr>
+          <p:cNvSpPr>
+            <a:spLocks noGrp="1" noRot="1" noChangeAspect="1" noMove="1" noResize="1" noEditPoints="1" noAdjustHandles="1" noChangeArrowheads="1" noChangeShapeType="1" noTextEdit="1"/>
+          </p:cNvSpPr>
+          <p:nvPr>
+            <p:extLst>
+              <p:ext uri="{386F3935-93C4-4BCD-93E2-E3B085C9AB24}">
+                <p16:designElem xmlns:p16="http://schemas.microsoft.com/office/powerpoint/2015/main" val="1"/>
+              </p:ext>
+            </p:extLst>
+          </p:nvPr>
+        </p:nvSpPr>
+        <p:spPr>
+          <a:xfrm>
+            <a:off x="4639056" y="0"/>
+            <a:ext cx="7552944" cy="6858000"/>
+          </a:xfrm>
+          <a:prstGeom prst="rect">
+            <a:avLst/>
+          </a:prstGeom>
+          <a:solidFill>
+            <a:srgbClr val="C8CACA"/>
+          </a:solidFill>
+          <a:ln>
+            <a:noFill/>
+          </a:ln>
+        </p:spPr>
+        <p:style>
+          <a:lnRef idx="2">
+            <a:schemeClr val="accent1">
+              <a:shade val="50000"/>
+            </a:schemeClr>
+          </a:lnRef>
+          <a:fillRef idx="1">
+            <a:schemeClr val="accent1"/>
+          </a:fillRef>
+          <a:effectRef idx="0">
+            <a:schemeClr val="accent1"/>
+          </a:effectRef>
+          <a:fontRef idx="minor">
+            <a:schemeClr val="lt1"/>
+          </a:fontRef>
+        </p:style>
+        <p:txBody>
+          <a:bodyPr rtlCol="0" anchor="ctr"/>
+          <a:lstStyle/>
+          <a:p>
+            <a:pPr algn="ctr"/>
+            <a:endParaRPr lang="en-US"/>
+          </a:p>
+        </p:txBody>
+      </p:sp>
+      <p:sp>
+        <p:nvSpPr>
+          <p:cNvPr id="17" name="Rounded Rectangle 20">
+            <a:extLst>
+              <a:ext uri="{FF2B5EF4-FFF2-40B4-BE49-F238E27FC236}">
+                <a16:creationId xmlns:a16="http://schemas.microsoft.com/office/drawing/2014/main" id="{A660F4F9-5DF5-4F15-BE6A-CD8648BB1148}"/>
+              </a:ext>
+              <a:ext uri="{C183D7F6-B498-43B3-948B-1728B52AA6E4}">
+                <adec:decorative xmlns:adec="http://schemas.microsoft.com/office/drawing/2017/decorative" val="1"/>
+              </a:ext>
+            </a:extLst>
+          </p:cNvPr>
+          <p:cNvSpPr>
+            <a:spLocks noGrp="1" noRot="1" noChangeAspect="1" noMove="1" noResize="1" noEditPoints="1" noAdjustHandles="1" noChangeArrowheads="1" noChangeShapeType="1" noTextEdit="1"/>
+          </p:cNvSpPr>
+          <p:nvPr>
+            <p:extLst>
+              <p:ext uri="{386F3935-93C4-4BCD-93E2-E3B085C9AB24}">
+                <p16:designElem xmlns:p16="http://schemas.microsoft.com/office/powerpoint/2015/main" val="1"/>
+              </p:ext>
+            </p:extLst>
+          </p:nvPr>
+        </p:nvSpPr>
+        <p:spPr>
+          <a:xfrm>
+            <a:off x="5118267" y="559407"/>
+            <a:ext cx="6594522" cy="5739187"/>
+          </a:xfrm>
+          <a:prstGeom prst="roundRect">
+            <a:avLst>
+              <a:gd name="adj" fmla="val 0"/>
+            </a:avLst>
+          </a:prstGeom>
+          <a:solidFill>
+            <a:srgbClr val="FFFFFF"/>
+          </a:solidFill>
+          <a:ln w="9525">
+            <a:solidFill>
+              <a:srgbClr val="C8CACA"/>
+            </a:solidFill>
+          </a:ln>
+          <a:effectLst>
+            <a:outerShdw blurRad="57150" dist="19050" dir="5400000" algn="t" rotWithShape="0">
+              <a:prstClr val="black">
+                <a:alpha val="63000"/>
+              </a:prstClr>
+            </a:outerShdw>
+          </a:effectLst>
+        </p:spPr>
+        <p:style>
+          <a:lnRef idx="2">
+            <a:schemeClr val="accent1">
+              <a:shade val="50000"/>
+            </a:schemeClr>
+          </a:lnRef>
+          <a:fillRef idx="1">
+            <a:schemeClr val="accent1"/>
+          </a:fillRef>
+          <a:effectRef idx="0">
+            <a:schemeClr val="accent1"/>
+          </a:effectRef>
+          <a:fontRef idx="minor">
+            <a:schemeClr val="lt1"/>
+          </a:fontRef>
+        </p:style>
+        <p:txBody>
+          <a:bodyPr rtlCol="0" anchor="ctr"/>
+          <a:lstStyle/>
+          <a:p>
+            <a:pPr algn="ctr"/>
+            <a:endParaRPr lang="en-US"/>
+          </a:p>
+        </p:txBody>
+      </p:sp>
+      <p:pic>
+        <p:nvPicPr>
+          <p:cNvPr id="5" name="Picture 4">
+            <a:extLst>
+              <a:ext uri="{FF2B5EF4-FFF2-40B4-BE49-F238E27FC236}">
+                <a16:creationId xmlns:a16="http://schemas.microsoft.com/office/drawing/2014/main" id="{15B3D723-D969-49E1-81B9-483AD44774C0}"/>
+              </a:ext>
+            </a:extLst>
+          </p:cNvPr>
+          <p:cNvPicPr>
+            <a:picLocks noChangeAspect="1"/>
+          </p:cNvPicPr>
+          <p:nvPr/>
+        </p:nvPicPr>
+        <p:blipFill rotWithShape="1">
+          <a:blip r:embed="rId2">
+            <a:extLst>
+              <a:ext uri="{28A0092B-C50C-407E-A947-70E740481C1C}">
+                <a14:useLocalDpi xmlns:a14="http://schemas.microsoft.com/office/drawing/2010/main" val="0"/>
+              </a:ext>
+            </a:extLst>
+          </a:blip>
+          <a:srcRect l="14865" r="13973"/>
+          <a:stretch/>
+        </p:blipFill>
+        <p:spPr>
+          <a:xfrm>
+            <a:off x="5283708" y="722376"/>
+            <a:ext cx="6263640" cy="5413248"/>
+          </a:xfrm>
+          <a:prstGeom prst="rect">
+            <a:avLst/>
+          </a:prstGeom>
+          <a:effectLst/>
+        </p:spPr>
+      </p:pic>
     </p:spTree>
     <p:extLst>
       <p:ext uri="{BB962C8B-B14F-4D97-AF65-F5344CB8AC3E}">
-        <p14:creationId xmlns:p14="http://schemas.microsoft.com/office/powerpoint/2010/main" val="3019894127"/>
+        <p14:creationId xmlns:p14="http://schemas.microsoft.com/office/powerpoint/2010/main" val="3769890924"/>
       </p:ext>
     </p:extLst>
   </p:cSld>
@@ -4618,6 +5260,14 @@
 <file path=ppt/slides/slide8.xml><?xml version="1.0" encoding="utf-8"?>
 <p:sld xmlns:a="http://schemas.openxmlformats.org/drawingml/2006/main" xmlns:r="http://schemas.openxmlformats.org/officeDocument/2006/relationships" xmlns:p="http://schemas.openxmlformats.org/presentationml/2006/main">
   <p:cSld>
+    <p:bg>
+      <p:bgPr>
+        <a:solidFill>
+          <a:schemeClr val="tx1"/>
+        </a:solidFill>
+        <a:effectLst/>
+      </p:bgPr>
+    </p:bg>
     <p:spTree>
       <p:nvGrpSpPr>
         <p:cNvPr id="1" name=""/>
@@ -4634,10 +5284,71 @@
       </p:grpSpPr>
       <p:sp>
         <p:nvSpPr>
-          <p:cNvPr id="7" name="Title 6">
-            <a:extLst>
-              <a:ext uri="{FF2B5EF4-FFF2-40B4-BE49-F238E27FC236}">
-                <a16:creationId xmlns:a16="http://schemas.microsoft.com/office/drawing/2014/main" id="{FEB1512C-3307-4434-A3A7-8DF15374F373}"/>
+          <p:cNvPr id="10" name="Rectangle 9">
+            <a:extLst>
+              <a:ext uri="{FF2B5EF4-FFF2-40B4-BE49-F238E27FC236}">
+                <a16:creationId xmlns:a16="http://schemas.microsoft.com/office/drawing/2014/main" id="{867D4867-5BA7-4462-B2F6-A23F4A622AA7}"/>
+              </a:ext>
+              <a:ext uri="{C183D7F6-B498-43B3-948B-1728B52AA6E4}">
+                <adec:decorative xmlns:adec="http://schemas.microsoft.com/office/drawing/2017/decorative" val="1"/>
+              </a:ext>
+            </a:extLst>
+          </p:cNvPr>
+          <p:cNvSpPr>
+            <a:spLocks noGrp="1" noRot="1" noChangeAspect="1" noMove="1" noResize="1" noEditPoints="1" noAdjustHandles="1" noChangeArrowheads="1" noChangeShapeType="1" noTextEdit="1"/>
+          </p:cNvSpPr>
+          <p:nvPr>
+            <p:extLst>
+              <p:ext uri="{386F3935-93C4-4BCD-93E2-E3B085C9AB24}">
+                <p16:designElem xmlns:p16="http://schemas.microsoft.com/office/powerpoint/2015/main" val="1"/>
+              </p:ext>
+            </p:extLst>
+          </p:nvPr>
+        </p:nvSpPr>
+        <p:spPr>
+          <a:xfrm>
+            <a:off x="0" y="0"/>
+            <a:ext cx="4654296" cy="6858000"/>
+          </a:xfrm>
+          <a:prstGeom prst="rect">
+            <a:avLst/>
+          </a:prstGeom>
+          <a:solidFill>
+            <a:srgbClr val="3F3F3F"/>
+          </a:solidFill>
+          <a:ln>
+            <a:noFill/>
+          </a:ln>
+        </p:spPr>
+        <p:style>
+          <a:lnRef idx="0">
+            <a:scrgbClr r="0" g="0" b="0"/>
+          </a:lnRef>
+          <a:fillRef idx="0">
+            <a:scrgbClr r="0" g="0" b="0"/>
+          </a:fillRef>
+          <a:effectRef idx="0">
+            <a:scrgbClr r="0" g="0" b="0"/>
+          </a:effectRef>
+          <a:fontRef idx="minor">
+            <a:schemeClr val="lt1"/>
+          </a:fontRef>
+        </p:style>
+        <p:txBody>
+          <a:bodyPr rtlCol="0" anchor="ctr"/>
+          <a:lstStyle/>
+          <a:p>
+            <a:pPr algn="ctr"/>
+            <a:endParaRPr lang="en-US" dirty="0"/>
+          </a:p>
+        </p:txBody>
+      </p:sp>
+      <p:sp>
+        <p:nvSpPr>
+          <p:cNvPr id="2" name="Title 1">
+            <a:extLst>
+              <a:ext uri="{FF2B5EF4-FFF2-40B4-BE49-F238E27FC236}">
+                <a16:creationId xmlns:a16="http://schemas.microsoft.com/office/drawing/2014/main" id="{CF6FE0D1-F184-44B3-8E41-B302ACDC6029}"/>
               </a:ext>
             </a:extLst>
           </p:cNvPr>
@@ -4648,24 +5359,38 @@
             <p:ph type="title"/>
           </p:nvPr>
         </p:nvSpPr>
-        <p:spPr/>
-        <p:txBody>
-          <a:bodyPr/>
-          <a:lstStyle/>
-          <a:p>
-            <a:r>
-              <a:rPr lang="en-US" dirty="0"/>
-              <a:t>Histogram</a:t>
-            </a:r>
-          </a:p>
-        </p:txBody>
-      </p:sp>
-      <p:sp>
-        <p:nvSpPr>
-          <p:cNvPr id="8" name="Content Placeholder 7">
-            <a:extLst>
-              <a:ext uri="{FF2B5EF4-FFF2-40B4-BE49-F238E27FC236}">
-                <a16:creationId xmlns:a16="http://schemas.microsoft.com/office/drawing/2014/main" id="{94B9E85B-A0DC-451B-9337-D65A5747D561}"/>
+        <p:spPr>
+          <a:xfrm>
+            <a:off x="643468" y="623392"/>
+            <a:ext cx="3363974" cy="1607060"/>
+          </a:xfrm>
+          <a:noFill/>
+          <a:ln w="19050">
+            <a:solidFill>
+              <a:schemeClr val="tx1"/>
+            </a:solidFill>
+          </a:ln>
+        </p:spPr>
+        <p:txBody>
+          <a:bodyPr vert="horz" wrap="square" lIns="91440" tIns="45720" rIns="91440" bIns="45720" rtlCol="0" anchor="ctr">
+            <a:normAutofit/>
+          </a:bodyPr>
+          <a:lstStyle/>
+          <a:p>
+            <a:pPr algn="ctr"/>
+            <a:r>
+              <a:rPr lang="en-US" sz="2800"/>
+              <a:t>Probability</a:t>
+            </a:r>
+          </a:p>
+        </p:txBody>
+      </p:sp>
+      <p:sp>
+        <p:nvSpPr>
+          <p:cNvPr id="3" name="Content Placeholder 2">
+            <a:extLst>
+              <a:ext uri="{FF2B5EF4-FFF2-40B4-BE49-F238E27FC236}">
+                <a16:creationId xmlns:a16="http://schemas.microsoft.com/office/drawing/2014/main" id="{4E4E225A-C512-4766-A900-708342E7E64B}"/>
               </a:ext>
             </a:extLst>
           </p:cNvPr>
@@ -4676,24 +5401,81 @@
             <p:ph idx="1"/>
           </p:nvPr>
         </p:nvSpPr>
-        <p:spPr/>
-        <p:txBody>
-          <a:bodyPr/>
-          <a:lstStyle/>
-          <a:p>
-            <a:endParaRPr lang="en-US"/>
-          </a:p>
-        </p:txBody>
-      </p:sp>
+        <p:spPr>
+          <a:xfrm>
+            <a:off x="643468" y="2638043"/>
+            <a:ext cx="3363974" cy="3415623"/>
+          </a:xfrm>
+        </p:spPr>
+        <p:txBody>
+          <a:bodyPr vert="horz" lIns="91440" tIns="45720" rIns="91440" bIns="45720" rtlCol="0">
+            <a:normAutofit/>
+          </a:bodyPr>
+          <a:lstStyle/>
+          <a:p>
+            <a:pPr marL="0" indent="0">
+              <a:buNone/>
+            </a:pPr>
+            <a:r>
+              <a:rPr lang="en-US" sz="2000" dirty="0"/>
+              <a:t>One shortcoming of the Field text is the lack of a chapter on probability. </a:t>
+            </a:r>
+          </a:p>
+          <a:p>
+            <a:pPr marL="0" indent="0">
+              <a:buNone/>
+            </a:pPr>
+            <a:r>
+              <a:rPr lang="en-US" sz="2000" dirty="0"/>
+              <a:t>I added some videos and readings which are relevant, although we won’t do a lot of exercises with it.</a:t>
+            </a:r>
+          </a:p>
+        </p:txBody>
+      </p:sp>
+      <p:pic>
+        <p:nvPicPr>
+          <p:cNvPr id="5" name="Picture 4">
+            <a:extLst>
+              <a:ext uri="{FF2B5EF4-FFF2-40B4-BE49-F238E27FC236}">
+                <a16:creationId xmlns:a16="http://schemas.microsoft.com/office/drawing/2014/main" id="{82B02B84-C556-494F-8ADE-20942D4752C4}"/>
+              </a:ext>
+            </a:extLst>
+          </p:cNvPr>
+          <p:cNvPicPr>
+            <a:picLocks noChangeAspect="1"/>
+          </p:cNvPicPr>
+          <p:nvPr/>
+        </p:nvPicPr>
+        <p:blipFill rotWithShape="1">
+          <a:blip r:embed="rId2">
+            <a:extLst>
+              <a:ext uri="{28A0092B-C50C-407E-A947-70E740481C1C}">
+                <a14:useLocalDpi xmlns:a14="http://schemas.microsoft.com/office/drawing/2010/main" val="0"/>
+              </a:ext>
+            </a:extLst>
+          </a:blip>
+          <a:srcRect l="12664" r="13969" b="-1"/>
+          <a:stretch/>
+        </p:blipFill>
+        <p:spPr>
+          <a:xfrm>
+            <a:off x="5449917" y="643467"/>
+            <a:ext cx="5946460" cy="5410199"/>
+          </a:xfrm>
+          <a:prstGeom prst="rect">
+            <a:avLst/>
+          </a:prstGeom>
+        </p:spPr>
+      </p:pic>
     </p:spTree>
     <p:extLst>
       <p:ext uri="{BB962C8B-B14F-4D97-AF65-F5344CB8AC3E}">
-        <p14:creationId xmlns:p14="http://schemas.microsoft.com/office/powerpoint/2010/main" val="2306074610"/>
+        <p14:creationId xmlns:p14="http://schemas.microsoft.com/office/powerpoint/2010/main" val="505025984"/>
       </p:ext>
     </p:extLst>
   </p:cSld>
   <p:clrMapOvr>
-    <a:masterClrMapping/>
+    <a:overrideClrMapping bg1="dk1" tx1="lt1" bg2="dk2" tx2="lt2" accent1="accent1" accent2="accent2" accent3="accent3" accent4="accent4" accent5="accent5" accent6="accent6" hlink="hlink" folHlink="folHlink"/>
   </p:clrMapOvr>
 </p:sld>
 </file>
@@ -4701,6 +5483,14 @@
 <file path=ppt/slides/slide9.xml><?xml version="1.0" encoding="utf-8"?>
 <p:sld xmlns:a="http://schemas.openxmlformats.org/drawingml/2006/main" xmlns:r="http://schemas.openxmlformats.org/officeDocument/2006/relationships" xmlns:p="http://schemas.openxmlformats.org/presentationml/2006/main">
   <p:cSld>
+    <p:bg>
+      <p:bgPr>
+        <a:solidFill>
+          <a:schemeClr val="bg1"/>
+        </a:solidFill>
+        <a:effectLst/>
+      </p:bgPr>
+    </p:bg>
     <p:spTree>
       <p:nvGrpSpPr>
         <p:cNvPr id="1" name=""/>
@@ -4720,7 +5510,7 @@
           <p:cNvPr id="2" name="Title 1">
             <a:extLst>
               <a:ext uri="{FF2B5EF4-FFF2-40B4-BE49-F238E27FC236}">
-                <a16:creationId xmlns:a16="http://schemas.microsoft.com/office/drawing/2014/main" id="{EE4F8E68-1C97-4AE7-A14F-2C9650C7DB0E}"/>
+                <a16:creationId xmlns:a16="http://schemas.microsoft.com/office/drawing/2014/main" id="{E3F9B50E-50EB-4FEE-A664-E8152B62CF5D}"/>
               </a:ext>
             </a:extLst>
           </p:cNvPr>
@@ -4731,24 +5521,127 @@
             <p:ph type="title"/>
           </p:nvPr>
         </p:nvSpPr>
-        <p:spPr/>
-        <p:txBody>
-          <a:bodyPr/>
-          <a:lstStyle/>
-          <a:p>
-            <a:r>
-              <a:rPr lang="en-US" dirty="0"/>
-              <a:t>Boxplot</a:t>
-            </a:r>
-          </a:p>
-        </p:txBody>
-      </p:sp>
+        <p:spPr>
+          <a:xfrm>
+            <a:off x="481013" y="3752849"/>
+            <a:ext cx="3290887" cy="2452687"/>
+          </a:xfrm>
+        </p:spPr>
+        <p:txBody>
+          <a:bodyPr anchor="ctr">
+            <a:normAutofit/>
+          </a:bodyPr>
+          <a:lstStyle/>
+          <a:p>
+            <a:r>
+              <a:rPr lang="en-US" sz="3600"/>
+              <a:t>Note about R and the Tidyverse</a:t>
+            </a:r>
+          </a:p>
+        </p:txBody>
+      </p:sp>
+      <p:pic>
+        <p:nvPicPr>
+          <p:cNvPr id="5" name="Picture 4">
+            <a:extLst>
+              <a:ext uri="{FF2B5EF4-FFF2-40B4-BE49-F238E27FC236}">
+                <a16:creationId xmlns:a16="http://schemas.microsoft.com/office/drawing/2014/main" id="{ECEB4D09-0534-483E-B189-5CCF34FBC229}"/>
+              </a:ext>
+            </a:extLst>
+          </p:cNvPr>
+          <p:cNvPicPr>
+            <a:picLocks noChangeAspect="1"/>
+          </p:cNvPicPr>
+          <p:nvPr/>
+        </p:nvPicPr>
+        <p:blipFill rotWithShape="1">
+          <a:blip r:embed="rId2">
+            <a:extLst>
+              <a:ext uri="{28A0092B-C50C-407E-A947-70E740481C1C}">
+                <a14:useLocalDpi xmlns:a14="http://schemas.microsoft.com/office/drawing/2010/main" val="0"/>
+              </a:ext>
+            </a:extLst>
+          </a:blip>
+          <a:srcRect t="21939" b="18385"/>
+          <a:stretch/>
+        </p:blipFill>
+        <p:spPr>
+          <a:xfrm>
+            <a:off x="20" y="10"/>
+            <a:ext cx="12191980" cy="3710603"/>
+          </a:xfrm>
+          <a:custGeom>
+            <a:avLst/>
+            <a:gdLst>
+              <a:gd name="connsiteX0" fmla="*/ 0 w 12192000"/>
+              <a:gd name="connsiteY0" fmla="*/ 0 h 3692092"/>
+              <a:gd name="connsiteX1" fmla="*/ 12192000 w 12192000"/>
+              <a:gd name="connsiteY1" fmla="*/ 0 h 3692092"/>
+              <a:gd name="connsiteX2" fmla="*/ 12192000 w 12192000"/>
+              <a:gd name="connsiteY2" fmla="*/ 3504824 h 3692092"/>
+              <a:gd name="connsiteX3" fmla="*/ 12024691 w 12192000"/>
+              <a:gd name="connsiteY3" fmla="*/ 3517794 h 3692092"/>
+              <a:gd name="connsiteX4" fmla="*/ 160485 w 12192000"/>
+              <a:gd name="connsiteY4" fmla="*/ 3663863 h 3692092"/>
+              <a:gd name="connsiteX5" fmla="*/ 0 w 12192000"/>
+              <a:gd name="connsiteY5" fmla="*/ 3692092 h 3692092"/>
+            </a:gdLst>
+            <a:ahLst/>
+            <a:cxnLst>
+              <a:cxn ang="0">
+                <a:pos x="connsiteX0" y="connsiteY0"/>
+              </a:cxn>
+              <a:cxn ang="0">
+                <a:pos x="connsiteX1" y="connsiteY1"/>
+              </a:cxn>
+              <a:cxn ang="0">
+                <a:pos x="connsiteX2" y="connsiteY2"/>
+              </a:cxn>
+              <a:cxn ang="0">
+                <a:pos x="connsiteX3" y="connsiteY3"/>
+              </a:cxn>
+              <a:cxn ang="0">
+                <a:pos x="connsiteX4" y="connsiteY4"/>
+              </a:cxn>
+              <a:cxn ang="0">
+                <a:pos x="connsiteX5" y="connsiteY5"/>
+              </a:cxn>
+            </a:cxnLst>
+            <a:rect l="l" t="t" r="r" b="b"/>
+            <a:pathLst>
+              <a:path w="12192000" h="3692092">
+                <a:moveTo>
+                  <a:pt x="0" y="0"/>
+                </a:moveTo>
+                <a:lnTo>
+                  <a:pt x="12192000" y="0"/>
+                </a:lnTo>
+                <a:lnTo>
+                  <a:pt x="12192000" y="3504824"/>
+                </a:lnTo>
+                <a:lnTo>
+                  <a:pt x="12024691" y="3517794"/>
+                </a:lnTo>
+                <a:cubicBezTo>
+                  <a:pt x="8077523" y="3783195"/>
+                  <a:pt x="4094678" y="3026959"/>
+                  <a:pt x="160485" y="3663863"/>
+                </a:cubicBezTo>
+                <a:lnTo>
+                  <a:pt x="0" y="3692092"/>
+                </a:lnTo>
+                <a:close/>
+              </a:path>
+            </a:pathLst>
+          </a:custGeom>
+        </p:spPr>
+      </p:pic>
       <p:sp>
         <p:nvSpPr>
           <p:cNvPr id="3" name="Content Placeholder 2">
             <a:extLst>
               <a:ext uri="{FF2B5EF4-FFF2-40B4-BE49-F238E27FC236}">
-                <a16:creationId xmlns:a16="http://schemas.microsoft.com/office/drawing/2014/main" id="{B771C897-F5AA-4AA3-8C87-C67DBD4FD5C6}"/>
+                <a16:creationId xmlns:a16="http://schemas.microsoft.com/office/drawing/2014/main" id="{93F60F28-4C55-4E9B-B45F-B6DE5CB6FE93}"/>
               </a:ext>
             </a:extLst>
           </p:cNvPr>
@@ -4759,19 +5652,81 @@
             <p:ph idx="1"/>
           </p:nvPr>
         </p:nvSpPr>
-        <p:spPr/>
-        <p:txBody>
-          <a:bodyPr/>
-          <a:lstStyle/>
-          <a:p>
-            <a:endParaRPr lang="en-US"/>
+        <p:spPr>
+          <a:xfrm>
+            <a:off x="4223982" y="3752850"/>
+            <a:ext cx="7485413" cy="2452687"/>
+          </a:xfrm>
+        </p:spPr>
+        <p:txBody>
+          <a:bodyPr anchor="ctr">
+            <a:normAutofit/>
+          </a:bodyPr>
+          <a:lstStyle/>
+          <a:p>
+            <a:r>
+              <a:rPr lang="en-US" sz="1400" dirty="0"/>
+              <a:t>There are many ways to accomplish the same task in R.</a:t>
+            </a:r>
+          </a:p>
+          <a:p>
+            <a:r>
+              <a:rPr lang="en-US" sz="1400" dirty="0"/>
+              <a:t>One challenge when searching for solutions is the multitude of options.</a:t>
+            </a:r>
+          </a:p>
+          <a:p>
+            <a:r>
+              <a:rPr lang="en-US" sz="1400" dirty="0"/>
+              <a:t>One reason for this is R has been around a while and is still evolving.</a:t>
+            </a:r>
+          </a:p>
+          <a:p>
+            <a:r>
+              <a:rPr lang="en-US" sz="1400" dirty="0"/>
+              <a:t>Sometimes old examples no longer work, or some packages don’t work well together</a:t>
+            </a:r>
+          </a:p>
+          <a:p>
+            <a:r>
+              <a:rPr lang="en-US" sz="1400" dirty="0"/>
+              <a:t>For this reason I have opted to try to use </a:t>
+            </a:r>
+            <a:r>
+              <a:rPr lang="en-US" sz="1400" dirty="0" err="1"/>
+              <a:t>Tidyverse</a:t>
+            </a:r>
+            <a:r>
+              <a:rPr lang="en-US" sz="1400" dirty="0"/>
+              <a:t> resources as much as possible (R for Data Science) for this class.</a:t>
+            </a:r>
+          </a:p>
+          <a:p>
+            <a:r>
+              <a:rPr lang="en-US" sz="1400" dirty="0"/>
+              <a:t>When searching for how to do something in R, I usually include the term “</a:t>
+            </a:r>
+            <a:r>
+              <a:rPr lang="en-US" sz="1400" dirty="0" err="1"/>
+              <a:t>Tidyverse</a:t>
+            </a:r>
+            <a:r>
+              <a:rPr lang="en-US" sz="1400" dirty="0"/>
+              <a:t>”.</a:t>
+            </a:r>
+          </a:p>
+          <a:p>
+            <a:r>
+              <a:rPr lang="en-US" sz="1400" dirty="0"/>
+              <a:t>I thought I’d pass that along as you’re learning to do statistics with R.</a:t>
+            </a:r>
           </a:p>
         </p:txBody>
       </p:sp>
     </p:spTree>
     <p:extLst>
       <p:ext uri="{BB962C8B-B14F-4D97-AF65-F5344CB8AC3E}">
-        <p14:creationId xmlns:p14="http://schemas.microsoft.com/office/powerpoint/2010/main" val="3217349876"/>
+        <p14:creationId xmlns:p14="http://schemas.microsoft.com/office/powerpoint/2010/main" val="14203932"/>
       </p:ext>
     </p:extLst>
   </p:cSld>

</xml_diff>